<commit_message>
Added a bunch more pictures.
</commit_message>
<xml_diff>
--- a/top teams/top teams.pptx
+++ b/top teams/top teams.pptx
@@ -6,6 +6,27 @@
   </p:sldMasterIdLst>
   <p:sldIdLst>
     <p:sldId id="256" r:id="rId2"/>
+    <p:sldId id="259" r:id="rId3"/>
+    <p:sldId id="260" r:id="rId4"/>
+    <p:sldId id="261" r:id="rId5"/>
+    <p:sldId id="262" r:id="rId6"/>
+    <p:sldId id="263" r:id="rId7"/>
+    <p:sldId id="264" r:id="rId8"/>
+    <p:sldId id="265" r:id="rId9"/>
+    <p:sldId id="266" r:id="rId10"/>
+    <p:sldId id="267" r:id="rId11"/>
+    <p:sldId id="268" r:id="rId12"/>
+    <p:sldId id="269" r:id="rId13"/>
+    <p:sldId id="270" r:id="rId14"/>
+    <p:sldId id="257" r:id="rId15"/>
+    <p:sldId id="271" r:id="rId16"/>
+    <p:sldId id="272" r:id="rId17"/>
+    <p:sldId id="273" r:id="rId18"/>
+    <p:sldId id="276" r:id="rId19"/>
+    <p:sldId id="275" r:id="rId20"/>
+    <p:sldId id="274" r:id="rId21"/>
+    <p:sldId id="277" r:id="rId22"/>
+    <p:sldId id="278" r:id="rId23"/>
   </p:sldIdLst>
   <p:sldSz cx="12192000" cy="6858000"/>
   <p:notesSz cx="6858000" cy="9144000"/>
@@ -221,71 +242,6 @@
           </a:p>
         </p:txBody>
       </p:sp>
-      <p:sp>
-        <p:nvSpPr>
-          <p:cNvPr id="4" name="Date Placeholder 3"/>
-          <p:cNvSpPr>
-            <a:spLocks noGrp="1"/>
-          </p:cNvSpPr>
-          <p:nvPr>
-            <p:ph type="dt" sz="half" idx="10"/>
-          </p:nvPr>
-        </p:nvSpPr>
-        <p:spPr/>
-        <p:txBody>
-          <a:bodyPr/>
-          <a:lstStyle/>
-          <a:p>
-            <a:fld id="{9A8A9685-B642-46B5-BA92-403CC3BFBA0C}" type="datetimeFigureOut">
-              <a:rPr lang="en-US" smtClean="0"/>
-              <a:t>2/27/2014</a:t>
-            </a:fld>
-            <a:endParaRPr lang="en-US"/>
-          </a:p>
-        </p:txBody>
-      </p:sp>
-      <p:sp>
-        <p:nvSpPr>
-          <p:cNvPr id="5" name="Footer Placeholder 4"/>
-          <p:cNvSpPr>
-            <a:spLocks noGrp="1"/>
-          </p:cNvSpPr>
-          <p:nvPr>
-            <p:ph type="ftr" sz="quarter" idx="11"/>
-          </p:nvPr>
-        </p:nvSpPr>
-        <p:spPr/>
-        <p:txBody>
-          <a:bodyPr/>
-          <a:lstStyle/>
-          <a:p>
-            <a:endParaRPr lang="en-US"/>
-          </a:p>
-        </p:txBody>
-      </p:sp>
-      <p:sp>
-        <p:nvSpPr>
-          <p:cNvPr id="6" name="Slide Number Placeholder 5"/>
-          <p:cNvSpPr>
-            <a:spLocks noGrp="1"/>
-          </p:cNvSpPr>
-          <p:nvPr>
-            <p:ph type="sldNum" sz="quarter" idx="12"/>
-          </p:nvPr>
-        </p:nvSpPr>
-        <p:spPr/>
-        <p:txBody>
-          <a:bodyPr/>
-          <a:lstStyle/>
-          <a:p>
-            <a:fld id="{24779EAB-BB74-41CA-9DC0-7B4AA9362422}" type="slidenum">
-              <a:rPr lang="en-US" smtClean="0"/>
-              <a:t>‹#›</a:t>
-            </a:fld>
-            <a:endParaRPr lang="en-US"/>
-          </a:p>
-        </p:txBody>
-      </p:sp>
     </p:spTree>
     <p:extLst>
       <p:ext uri="{BB962C8B-B14F-4D97-AF65-F5344CB8AC3E}">
@@ -296,10 +252,298 @@
   <p:clrMapOvr>
     <a:masterClrMapping/>
   </p:clrMapOvr>
+  <p:timing>
+    <p:tnLst>
+      <p:par>
+        <p:cTn id="1" dur="indefinite" restart="never" nodeType="tmRoot"/>
+      </p:par>
+    </p:tnLst>
+  </p:timing>
 </p:sldLayout>
 </file>
 
 <file path=ppt/slideLayouts/slideLayout10.xml><?xml version="1.0" encoding="utf-8"?>
+<p:sldLayout xmlns:a="http://schemas.openxmlformats.org/drawingml/2006/main" xmlns:r="http://schemas.openxmlformats.org/officeDocument/2006/relationships" xmlns:p="http://schemas.openxmlformats.org/presentationml/2006/main" type="picTx" preserve="1">
+  <p:cSld name="Picture with Caption">
+    <p:spTree>
+      <p:nvGrpSpPr>
+        <p:cNvPr id="1" name=""/>
+        <p:cNvGrpSpPr/>
+        <p:nvPr/>
+      </p:nvGrpSpPr>
+      <p:grpSpPr>
+        <a:xfrm>
+          <a:off x="0" y="0"/>
+          <a:ext cx="0" cy="0"/>
+          <a:chOff x="0" y="0"/>
+          <a:chExt cx="0" cy="0"/>
+        </a:xfrm>
+      </p:grpSpPr>
+      <p:sp>
+        <p:nvSpPr>
+          <p:cNvPr id="2" name="Title 1"/>
+          <p:cNvSpPr>
+            <a:spLocks noGrp="1"/>
+          </p:cNvSpPr>
+          <p:nvPr>
+            <p:ph type="title"/>
+          </p:nvPr>
+        </p:nvSpPr>
+        <p:spPr>
+          <a:xfrm>
+            <a:off x="839788" y="457200"/>
+            <a:ext cx="3932237" cy="1600200"/>
+          </a:xfrm>
+        </p:spPr>
+        <p:txBody>
+          <a:bodyPr anchor="b"/>
+          <a:lstStyle>
+            <a:lvl1pPr>
+              <a:defRPr sz="3200"/>
+            </a:lvl1pPr>
+          </a:lstStyle>
+          <a:p>
+            <a:r>
+              <a:rPr lang="en-US" smtClean="0"/>
+              <a:t>Click to edit Master title style</a:t>
+            </a:r>
+            <a:endParaRPr lang="en-US" dirty="0"/>
+          </a:p>
+        </p:txBody>
+      </p:sp>
+      <p:sp>
+        <p:nvSpPr>
+          <p:cNvPr id="3" name="Picture Placeholder 2"/>
+          <p:cNvSpPr>
+            <a:spLocks noGrp="1" noChangeAspect="1"/>
+          </p:cNvSpPr>
+          <p:nvPr>
+            <p:ph type="pic" idx="1"/>
+          </p:nvPr>
+        </p:nvSpPr>
+        <p:spPr>
+          <a:xfrm>
+            <a:off x="5183188" y="987425"/>
+            <a:ext cx="6172200" cy="4873625"/>
+          </a:xfrm>
+        </p:spPr>
+        <p:txBody>
+          <a:bodyPr anchor="t"/>
+          <a:lstStyle>
+            <a:lvl1pPr marL="0" indent="0">
+              <a:buNone/>
+              <a:defRPr sz="3200"/>
+            </a:lvl1pPr>
+            <a:lvl2pPr marL="457200" indent="0">
+              <a:buNone/>
+              <a:defRPr sz="2800"/>
+            </a:lvl2pPr>
+            <a:lvl3pPr marL="914400" indent="0">
+              <a:buNone/>
+              <a:defRPr sz="2400"/>
+            </a:lvl3pPr>
+            <a:lvl4pPr marL="1371600" indent="0">
+              <a:buNone/>
+              <a:defRPr sz="2000"/>
+            </a:lvl4pPr>
+            <a:lvl5pPr marL="1828800" indent="0">
+              <a:buNone/>
+              <a:defRPr sz="2000"/>
+            </a:lvl5pPr>
+            <a:lvl6pPr marL="2286000" indent="0">
+              <a:buNone/>
+              <a:defRPr sz="2000"/>
+            </a:lvl6pPr>
+            <a:lvl7pPr marL="2743200" indent="0">
+              <a:buNone/>
+              <a:defRPr sz="2000"/>
+            </a:lvl7pPr>
+            <a:lvl8pPr marL="3200400" indent="0">
+              <a:buNone/>
+              <a:defRPr sz="2000"/>
+            </a:lvl8pPr>
+            <a:lvl9pPr marL="3657600" indent="0">
+              <a:buNone/>
+              <a:defRPr sz="2000"/>
+            </a:lvl9pPr>
+          </a:lstStyle>
+          <a:p>
+            <a:r>
+              <a:rPr lang="en-US" smtClean="0"/>
+              <a:t>Click icon to add picture</a:t>
+            </a:r>
+            <a:endParaRPr lang="en-US" dirty="0"/>
+          </a:p>
+        </p:txBody>
+      </p:sp>
+      <p:sp>
+        <p:nvSpPr>
+          <p:cNvPr id="4" name="Text Placeholder 3"/>
+          <p:cNvSpPr>
+            <a:spLocks noGrp="1"/>
+          </p:cNvSpPr>
+          <p:nvPr>
+            <p:ph type="body" sz="half" idx="2"/>
+          </p:nvPr>
+        </p:nvSpPr>
+        <p:spPr>
+          <a:xfrm>
+            <a:off x="839788" y="2057400"/>
+            <a:ext cx="3932237" cy="3811588"/>
+          </a:xfrm>
+        </p:spPr>
+        <p:txBody>
+          <a:bodyPr/>
+          <a:lstStyle>
+            <a:lvl1pPr marL="0" indent="0">
+              <a:buNone/>
+              <a:defRPr sz="1600"/>
+            </a:lvl1pPr>
+            <a:lvl2pPr marL="457200" indent="0">
+              <a:buNone/>
+              <a:defRPr sz="1400"/>
+            </a:lvl2pPr>
+            <a:lvl3pPr marL="914400" indent="0">
+              <a:buNone/>
+              <a:defRPr sz="1200"/>
+            </a:lvl3pPr>
+            <a:lvl4pPr marL="1371600" indent="0">
+              <a:buNone/>
+              <a:defRPr sz="1000"/>
+            </a:lvl4pPr>
+            <a:lvl5pPr marL="1828800" indent="0">
+              <a:buNone/>
+              <a:defRPr sz="1000"/>
+            </a:lvl5pPr>
+            <a:lvl6pPr marL="2286000" indent="0">
+              <a:buNone/>
+              <a:defRPr sz="1000"/>
+            </a:lvl6pPr>
+            <a:lvl7pPr marL="2743200" indent="0">
+              <a:buNone/>
+              <a:defRPr sz="1000"/>
+            </a:lvl7pPr>
+            <a:lvl8pPr marL="3200400" indent="0">
+              <a:buNone/>
+              <a:defRPr sz="1000"/>
+            </a:lvl8pPr>
+            <a:lvl9pPr marL="3657600" indent="0">
+              <a:buNone/>
+              <a:defRPr sz="1000"/>
+            </a:lvl9pPr>
+          </a:lstStyle>
+          <a:p>
+            <a:pPr lvl="0"/>
+            <a:r>
+              <a:rPr lang="en-US" smtClean="0"/>
+              <a:t>Click to edit Master text styles</a:t>
+            </a:r>
+          </a:p>
+        </p:txBody>
+      </p:sp>
+      <p:sp>
+        <p:nvSpPr>
+          <p:cNvPr id="5" name="Date Placeholder 4"/>
+          <p:cNvSpPr>
+            <a:spLocks noGrp="1"/>
+          </p:cNvSpPr>
+          <p:nvPr>
+            <p:ph type="dt" sz="half" idx="10"/>
+          </p:nvPr>
+        </p:nvSpPr>
+        <p:spPr>
+          <a:xfrm>
+            <a:off x="838200" y="6356350"/>
+            <a:ext cx="2743200" cy="365125"/>
+          </a:xfrm>
+          <a:prstGeom prst="rect">
+            <a:avLst/>
+          </a:prstGeom>
+        </p:spPr>
+        <p:txBody>
+          <a:bodyPr/>
+          <a:lstStyle/>
+          <a:p>
+            <a:fld id="{9A8A9685-B642-46B5-BA92-403CC3BFBA0C}" type="datetimeFigureOut">
+              <a:rPr lang="en-US" smtClean="0"/>
+              <a:t>2/27/2014</a:t>
+            </a:fld>
+            <a:endParaRPr lang="en-US"/>
+          </a:p>
+        </p:txBody>
+      </p:sp>
+      <p:sp>
+        <p:nvSpPr>
+          <p:cNvPr id="6" name="Footer Placeholder 5"/>
+          <p:cNvSpPr>
+            <a:spLocks noGrp="1"/>
+          </p:cNvSpPr>
+          <p:nvPr>
+            <p:ph type="ftr" sz="quarter" idx="11"/>
+          </p:nvPr>
+        </p:nvSpPr>
+        <p:spPr>
+          <a:xfrm>
+            <a:off x="4038600" y="6356350"/>
+            <a:ext cx="4114800" cy="365125"/>
+          </a:xfrm>
+          <a:prstGeom prst="rect">
+            <a:avLst/>
+          </a:prstGeom>
+        </p:spPr>
+        <p:txBody>
+          <a:bodyPr/>
+          <a:lstStyle/>
+          <a:p>
+            <a:endParaRPr lang="en-US"/>
+          </a:p>
+        </p:txBody>
+      </p:sp>
+      <p:sp>
+        <p:nvSpPr>
+          <p:cNvPr id="7" name="Slide Number Placeholder 6"/>
+          <p:cNvSpPr>
+            <a:spLocks noGrp="1"/>
+          </p:cNvSpPr>
+          <p:nvPr>
+            <p:ph type="sldNum" sz="quarter" idx="12"/>
+          </p:nvPr>
+        </p:nvSpPr>
+        <p:spPr>
+          <a:xfrm>
+            <a:off x="8610600" y="6356350"/>
+            <a:ext cx="2743200" cy="365125"/>
+          </a:xfrm>
+          <a:prstGeom prst="rect">
+            <a:avLst/>
+          </a:prstGeom>
+        </p:spPr>
+        <p:txBody>
+          <a:bodyPr/>
+          <a:lstStyle/>
+          <a:p>
+            <a:fld id="{24779EAB-BB74-41CA-9DC0-7B4AA9362422}" type="slidenum">
+              <a:rPr lang="en-US" smtClean="0"/>
+              <a:t>‹#›</a:t>
+            </a:fld>
+            <a:endParaRPr lang="en-US"/>
+          </a:p>
+        </p:txBody>
+      </p:sp>
+    </p:spTree>
+    <p:extLst>
+      <p:ext uri="{BB962C8B-B14F-4D97-AF65-F5344CB8AC3E}">
+        <p14:creationId xmlns:p14="http://schemas.microsoft.com/office/powerpoint/2010/main" val="2917938030"/>
+      </p:ext>
+    </p:extLst>
+  </p:cSld>
+  <p:clrMapOvr>
+    <a:masterClrMapping/>
+  </p:clrMapOvr>
+</p:sldLayout>
+</file>
+
+<file path=ppt/slideLayouts/slideLayout11.xml><?xml version="1.0" encoding="utf-8"?>
 <p:sldLayout xmlns:a="http://schemas.openxmlformats.org/drawingml/2006/main" xmlns:r="http://schemas.openxmlformats.org/officeDocument/2006/relationships" xmlns:p="http://schemas.openxmlformats.org/presentationml/2006/main" type="vertTx" preserve="1">
   <p:cSld name="Title and Vertical Text">
     <p:spTree>
@@ -401,7 +645,15 @@
             <p:ph type="dt" sz="half" idx="10"/>
           </p:nvPr>
         </p:nvSpPr>
-        <p:spPr/>
+        <p:spPr>
+          <a:xfrm>
+            <a:off x="838200" y="6356350"/>
+            <a:ext cx="2743200" cy="365125"/>
+          </a:xfrm>
+          <a:prstGeom prst="rect">
+            <a:avLst/>
+          </a:prstGeom>
+        </p:spPr>
         <p:txBody>
           <a:bodyPr/>
           <a:lstStyle/>
@@ -424,7 +676,15 @@
             <p:ph type="ftr" sz="quarter" idx="11"/>
           </p:nvPr>
         </p:nvSpPr>
-        <p:spPr/>
+        <p:spPr>
+          <a:xfrm>
+            <a:off x="4038600" y="6356350"/>
+            <a:ext cx="4114800" cy="365125"/>
+          </a:xfrm>
+          <a:prstGeom prst="rect">
+            <a:avLst/>
+          </a:prstGeom>
+        </p:spPr>
         <p:txBody>
           <a:bodyPr/>
           <a:lstStyle/>
@@ -443,7 +703,15 @@
             <p:ph type="sldNum" sz="quarter" idx="12"/>
           </p:nvPr>
         </p:nvSpPr>
-        <p:spPr/>
+        <p:spPr>
+          <a:xfrm>
+            <a:off x="8610600" y="6356350"/>
+            <a:ext cx="2743200" cy="365125"/>
+          </a:xfrm>
+          <a:prstGeom prst="rect">
+            <a:avLst/>
+          </a:prstGeom>
+        </p:spPr>
         <p:txBody>
           <a:bodyPr/>
           <a:lstStyle/>
@@ -469,7 +737,7 @@
 </p:sldLayout>
 </file>
 
-<file path=ppt/slideLayouts/slideLayout11.xml><?xml version="1.0" encoding="utf-8"?>
+<file path=ppt/slideLayouts/slideLayout12.xml><?xml version="1.0" encoding="utf-8"?>
 <p:sldLayout xmlns:a="http://schemas.openxmlformats.org/drawingml/2006/main" xmlns:r="http://schemas.openxmlformats.org/officeDocument/2006/relationships" xmlns:p="http://schemas.openxmlformats.org/presentationml/2006/main" type="vertTitleAndTx" preserve="1">
   <p:cSld name="Vertical Title and Text">
     <p:spTree>
@@ -581,7 +849,15 @@
             <p:ph type="dt" sz="half" idx="10"/>
           </p:nvPr>
         </p:nvSpPr>
-        <p:spPr/>
+        <p:spPr>
+          <a:xfrm>
+            <a:off x="838200" y="6356350"/>
+            <a:ext cx="2743200" cy="365125"/>
+          </a:xfrm>
+          <a:prstGeom prst="rect">
+            <a:avLst/>
+          </a:prstGeom>
+        </p:spPr>
         <p:txBody>
           <a:bodyPr/>
           <a:lstStyle/>
@@ -604,7 +880,15 @@
             <p:ph type="ftr" sz="quarter" idx="11"/>
           </p:nvPr>
         </p:nvSpPr>
-        <p:spPr/>
+        <p:spPr>
+          <a:xfrm>
+            <a:off x="4038600" y="6356350"/>
+            <a:ext cx="4114800" cy="365125"/>
+          </a:xfrm>
+          <a:prstGeom prst="rect">
+            <a:avLst/>
+          </a:prstGeom>
+        </p:spPr>
         <p:txBody>
           <a:bodyPr/>
           <a:lstStyle/>
@@ -623,7 +907,15 @@
             <p:ph type="sldNum" sz="quarter" idx="12"/>
           </p:nvPr>
         </p:nvSpPr>
-        <p:spPr/>
+        <p:spPr>
+          <a:xfrm>
+            <a:off x="8610600" y="6356350"/>
+            <a:ext cx="2743200" cy="365125"/>
+          </a:xfrm>
+          <a:prstGeom prst="rect">
+            <a:avLst/>
+          </a:prstGeom>
+        </p:spPr>
         <p:txBody>
           <a:bodyPr/>
           <a:lstStyle/>
@@ -741,71 +1033,6 @@
           </a:p>
         </p:txBody>
       </p:sp>
-      <p:sp>
-        <p:nvSpPr>
-          <p:cNvPr id="4" name="Date Placeholder 3"/>
-          <p:cNvSpPr>
-            <a:spLocks noGrp="1"/>
-          </p:cNvSpPr>
-          <p:nvPr>
-            <p:ph type="dt" sz="half" idx="10"/>
-          </p:nvPr>
-        </p:nvSpPr>
-        <p:spPr/>
-        <p:txBody>
-          <a:bodyPr/>
-          <a:lstStyle/>
-          <a:p>
-            <a:fld id="{9A8A9685-B642-46B5-BA92-403CC3BFBA0C}" type="datetimeFigureOut">
-              <a:rPr lang="en-US" smtClean="0"/>
-              <a:t>2/27/2014</a:t>
-            </a:fld>
-            <a:endParaRPr lang="en-US"/>
-          </a:p>
-        </p:txBody>
-      </p:sp>
-      <p:sp>
-        <p:nvSpPr>
-          <p:cNvPr id="5" name="Footer Placeholder 4"/>
-          <p:cNvSpPr>
-            <a:spLocks noGrp="1"/>
-          </p:cNvSpPr>
-          <p:nvPr>
-            <p:ph type="ftr" sz="quarter" idx="11"/>
-          </p:nvPr>
-        </p:nvSpPr>
-        <p:spPr/>
-        <p:txBody>
-          <a:bodyPr/>
-          <a:lstStyle/>
-          <a:p>
-            <a:endParaRPr lang="en-US"/>
-          </a:p>
-        </p:txBody>
-      </p:sp>
-      <p:sp>
-        <p:nvSpPr>
-          <p:cNvPr id="6" name="Slide Number Placeholder 5"/>
-          <p:cNvSpPr>
-            <a:spLocks noGrp="1"/>
-          </p:cNvSpPr>
-          <p:nvPr>
-            <p:ph type="sldNum" sz="quarter" idx="12"/>
-          </p:nvPr>
-        </p:nvSpPr>
-        <p:spPr/>
-        <p:txBody>
-          <a:bodyPr/>
-          <a:lstStyle/>
-          <a:p>
-            <a:fld id="{24779EAB-BB74-41CA-9DC0-7B4AA9362422}" type="slidenum">
-              <a:rPr lang="en-US" smtClean="0"/>
-              <a:t>‹#›</a:t>
-            </a:fld>
-            <a:endParaRPr lang="en-US"/>
-          </a:p>
-        </p:txBody>
-      </p:sp>
     </p:spTree>
     <p:extLst>
       <p:ext uri="{BB962C8B-B14F-4D97-AF65-F5344CB8AC3E}">
@@ -816,10 +1043,163 @@
   <p:clrMapOvr>
     <a:masterClrMapping/>
   </p:clrMapOvr>
+  <p:timing>
+    <p:tnLst>
+      <p:par>
+        <p:cTn id="1" dur="indefinite" restart="never" nodeType="tmRoot"/>
+      </p:par>
+    </p:tnLst>
+  </p:timing>
 </p:sldLayout>
 </file>
 
 <file path=ppt/slideLayouts/slideLayout3.xml><?xml version="1.0" encoding="utf-8"?>
+<p:sldLayout xmlns:a="http://schemas.openxmlformats.org/drawingml/2006/main" xmlns:r="http://schemas.openxmlformats.org/officeDocument/2006/relationships" xmlns:p="http://schemas.openxmlformats.org/presentationml/2006/main" preserve="1" userDrawn="1">
+  <p:cSld name="Concept over image">
+    <p:spTree>
+      <p:nvGrpSpPr>
+        <p:cNvPr id="1" name=""/>
+        <p:cNvGrpSpPr/>
+        <p:nvPr/>
+      </p:nvGrpSpPr>
+      <p:grpSpPr>
+        <a:xfrm>
+          <a:off x="0" y="0"/>
+          <a:ext cx="0" cy="0"/>
+          <a:chOff x="0" y="0"/>
+          <a:chExt cx="0" cy="0"/>
+        </a:xfrm>
+      </p:grpSpPr>
+      <p:sp>
+        <p:nvSpPr>
+          <p:cNvPr id="16" name="Picture Placeholder 15"/>
+          <p:cNvSpPr>
+            <a:spLocks noGrp="1"/>
+          </p:cNvSpPr>
+          <p:nvPr>
+            <p:ph type="pic" sz="quarter" idx="11"/>
+          </p:nvPr>
+        </p:nvSpPr>
+        <p:spPr>
+          <a:xfrm>
+            <a:off x="0" y="0"/>
+            <a:ext cx="12192000" cy="6858000"/>
+          </a:xfrm>
+        </p:spPr>
+        <p:txBody>
+          <a:bodyPr/>
+          <a:lstStyle/>
+          <a:p>
+            <a:endParaRPr lang="en-US"/>
+          </a:p>
+        </p:txBody>
+      </p:sp>
+      <p:sp>
+        <p:nvSpPr>
+          <p:cNvPr id="2" name="Title 1"/>
+          <p:cNvSpPr>
+            <a:spLocks noGrp="1"/>
+          </p:cNvSpPr>
+          <p:nvPr>
+            <p:ph type="title"/>
+          </p:nvPr>
+        </p:nvSpPr>
+        <p:spPr>
+          <a:xfrm>
+            <a:off x="0" y="365125"/>
+            <a:ext cx="12192000" cy="1325563"/>
+          </a:xfrm>
+          <a:solidFill>
+            <a:srgbClr val="000000">
+              <a:alpha val="69804"/>
+            </a:srgbClr>
+          </a:solidFill>
+        </p:spPr>
+        <p:txBody>
+          <a:bodyPr/>
+          <a:lstStyle>
+            <a:lvl1pPr algn="ctr">
+              <a:defRPr>
+                <a:solidFill>
+                  <a:schemeClr val="bg1"/>
+                </a:solidFill>
+              </a:defRPr>
+            </a:lvl1pPr>
+          </a:lstStyle>
+          <a:p>
+            <a:r>
+              <a:rPr lang="en-US" smtClean="0"/>
+              <a:t>Click to edit Master title style</a:t>
+            </a:r>
+            <a:endParaRPr lang="en-US" dirty="0"/>
+          </a:p>
+        </p:txBody>
+      </p:sp>
+      <p:sp>
+        <p:nvSpPr>
+          <p:cNvPr id="14" name="Text Placeholder 13"/>
+          <p:cNvSpPr>
+            <a:spLocks noGrp="1"/>
+          </p:cNvSpPr>
+          <p:nvPr>
+            <p:ph type="body" sz="quarter" idx="10" hasCustomPrompt="1"/>
+          </p:nvPr>
+        </p:nvSpPr>
+        <p:spPr>
+          <a:xfrm>
+            <a:off x="0" y="6329083"/>
+            <a:ext cx="12192000" cy="528918"/>
+          </a:xfrm>
+          <a:solidFill>
+            <a:srgbClr val="000000">
+              <a:alpha val="69804"/>
+            </a:srgbClr>
+          </a:solidFill>
+        </p:spPr>
+        <p:txBody>
+          <a:bodyPr anchor="ctr">
+            <a:normAutofit/>
+          </a:bodyPr>
+          <a:lstStyle>
+            <a:lvl1pPr marL="0" indent="0" algn="r">
+              <a:buNone/>
+              <a:defRPr sz="2000" baseline="0">
+                <a:solidFill>
+                  <a:schemeClr val="bg1"/>
+                </a:solidFill>
+              </a:defRPr>
+            </a:lvl1pPr>
+          </a:lstStyle>
+          <a:p>
+            <a:pPr lvl="0"/>
+            <a:r>
+              <a:rPr lang="en-US" dirty="0" smtClean="0"/>
+              <a:t>Click to pick who to use as the story</a:t>
+            </a:r>
+          </a:p>
+        </p:txBody>
+      </p:sp>
+    </p:spTree>
+    <p:extLst>
+      <p:ext uri="{BB962C8B-B14F-4D97-AF65-F5344CB8AC3E}">
+        <p14:creationId xmlns:p14="http://schemas.microsoft.com/office/powerpoint/2010/main" val="3116174525"/>
+      </p:ext>
+    </p:extLst>
+  </p:cSld>
+  <p:clrMapOvr>
+    <a:masterClrMapping/>
+  </p:clrMapOvr>
+  <p:timing>
+    <p:tnLst>
+      <p:par>
+        <p:cTn id="1" dur="indefinite" restart="never" nodeType="tmRoot"/>
+      </p:par>
+    </p:tnLst>
+  </p:timing>
+</p:sldLayout>
+</file>
+
+<file path=ppt/slideLayouts/slideLayout4.xml><?xml version="1.0" encoding="utf-8"?>
 <p:sldLayout xmlns:a="http://schemas.openxmlformats.org/drawingml/2006/main" xmlns:r="http://schemas.openxmlformats.org/officeDocument/2006/relationships" xmlns:p="http://schemas.openxmlformats.org/presentationml/2006/main" type="secHead" preserve="1">
   <p:cSld name="Section Header">
     <p:spTree>
@@ -997,7 +1377,15 @@
             <p:ph type="dt" sz="half" idx="10"/>
           </p:nvPr>
         </p:nvSpPr>
-        <p:spPr/>
+        <p:spPr>
+          <a:xfrm>
+            <a:off x="838200" y="6356350"/>
+            <a:ext cx="2743200" cy="365125"/>
+          </a:xfrm>
+          <a:prstGeom prst="rect">
+            <a:avLst/>
+          </a:prstGeom>
+        </p:spPr>
         <p:txBody>
           <a:bodyPr/>
           <a:lstStyle/>
@@ -1020,7 +1408,15 @@
             <p:ph type="ftr" sz="quarter" idx="11"/>
           </p:nvPr>
         </p:nvSpPr>
-        <p:spPr/>
+        <p:spPr>
+          <a:xfrm>
+            <a:off x="4038600" y="6356350"/>
+            <a:ext cx="4114800" cy="365125"/>
+          </a:xfrm>
+          <a:prstGeom prst="rect">
+            <a:avLst/>
+          </a:prstGeom>
+        </p:spPr>
         <p:txBody>
           <a:bodyPr/>
           <a:lstStyle/>
@@ -1039,7 +1435,15 @@
             <p:ph type="sldNum" sz="quarter" idx="12"/>
           </p:nvPr>
         </p:nvSpPr>
-        <p:spPr/>
+        <p:spPr>
+          <a:xfrm>
+            <a:off x="8610600" y="6356350"/>
+            <a:ext cx="2743200" cy="365125"/>
+          </a:xfrm>
+          <a:prstGeom prst="rect">
+            <a:avLst/>
+          </a:prstGeom>
+        </p:spPr>
         <p:txBody>
           <a:bodyPr/>
           <a:lstStyle/>
@@ -1062,10 +1466,17 @@
   <p:clrMapOvr>
     <a:masterClrMapping/>
   </p:clrMapOvr>
+  <p:timing>
+    <p:tnLst>
+      <p:par>
+        <p:cTn id="1" dur="indefinite" restart="never" nodeType="tmRoot"/>
+      </p:par>
+    </p:tnLst>
+  </p:timing>
 </p:sldLayout>
 </file>
 
-<file path=ppt/slideLayouts/slideLayout4.xml><?xml version="1.0" encoding="utf-8"?>
+<file path=ppt/slideLayouts/slideLayout5.xml><?xml version="1.0" encoding="utf-8"?>
 <p:sldLayout xmlns:a="http://schemas.openxmlformats.org/drawingml/2006/main" xmlns:r="http://schemas.openxmlformats.org/officeDocument/2006/relationships" xmlns:p="http://schemas.openxmlformats.org/presentationml/2006/main" type="twoObj" preserve="1">
   <p:cSld name="Two Content">
     <p:spTree>
@@ -1229,7 +1640,15 @@
             <p:ph type="dt" sz="half" idx="10"/>
           </p:nvPr>
         </p:nvSpPr>
-        <p:spPr/>
+        <p:spPr>
+          <a:xfrm>
+            <a:off x="838200" y="6356350"/>
+            <a:ext cx="2743200" cy="365125"/>
+          </a:xfrm>
+          <a:prstGeom prst="rect">
+            <a:avLst/>
+          </a:prstGeom>
+        </p:spPr>
         <p:txBody>
           <a:bodyPr/>
           <a:lstStyle/>
@@ -1252,7 +1671,15 @@
             <p:ph type="ftr" sz="quarter" idx="11"/>
           </p:nvPr>
         </p:nvSpPr>
-        <p:spPr/>
+        <p:spPr>
+          <a:xfrm>
+            <a:off x="4038600" y="6356350"/>
+            <a:ext cx="4114800" cy="365125"/>
+          </a:xfrm>
+          <a:prstGeom prst="rect">
+            <a:avLst/>
+          </a:prstGeom>
+        </p:spPr>
         <p:txBody>
           <a:bodyPr/>
           <a:lstStyle/>
@@ -1271,7 +1698,15 @@
             <p:ph type="sldNum" sz="quarter" idx="12"/>
           </p:nvPr>
         </p:nvSpPr>
-        <p:spPr/>
+        <p:spPr>
+          <a:xfrm>
+            <a:off x="8610600" y="6356350"/>
+            <a:ext cx="2743200" cy="365125"/>
+          </a:xfrm>
+          <a:prstGeom prst="rect">
+            <a:avLst/>
+          </a:prstGeom>
+        </p:spPr>
         <p:txBody>
           <a:bodyPr/>
           <a:lstStyle/>
@@ -1297,7 +1732,7 @@
 </p:sldLayout>
 </file>
 
-<file path=ppt/slideLayouts/slideLayout5.xml><?xml version="1.0" encoding="utf-8"?>
+<file path=ppt/slideLayouts/slideLayout6.xml><?xml version="1.0" encoding="utf-8"?>
 <p:sldLayout xmlns:a="http://schemas.openxmlformats.org/drawingml/2006/main" xmlns:r="http://schemas.openxmlformats.org/officeDocument/2006/relationships" xmlns:p="http://schemas.openxmlformats.org/presentationml/2006/main" type="twoTxTwoObj" preserve="1">
   <p:cSld name="Comparison">
     <p:spTree>
@@ -1596,7 +2031,15 @@
             <p:ph type="dt" sz="half" idx="10"/>
           </p:nvPr>
         </p:nvSpPr>
-        <p:spPr/>
+        <p:spPr>
+          <a:xfrm>
+            <a:off x="838200" y="6356350"/>
+            <a:ext cx="2743200" cy="365125"/>
+          </a:xfrm>
+          <a:prstGeom prst="rect">
+            <a:avLst/>
+          </a:prstGeom>
+        </p:spPr>
         <p:txBody>
           <a:bodyPr/>
           <a:lstStyle/>
@@ -1619,7 +2062,15 @@
             <p:ph type="ftr" sz="quarter" idx="11"/>
           </p:nvPr>
         </p:nvSpPr>
-        <p:spPr/>
+        <p:spPr>
+          <a:xfrm>
+            <a:off x="4038600" y="6356350"/>
+            <a:ext cx="4114800" cy="365125"/>
+          </a:xfrm>
+          <a:prstGeom prst="rect">
+            <a:avLst/>
+          </a:prstGeom>
+        </p:spPr>
         <p:txBody>
           <a:bodyPr/>
           <a:lstStyle/>
@@ -1638,7 +2089,15 @@
             <p:ph type="sldNum" sz="quarter" idx="12"/>
           </p:nvPr>
         </p:nvSpPr>
-        <p:spPr/>
+        <p:spPr>
+          <a:xfrm>
+            <a:off x="8610600" y="6356350"/>
+            <a:ext cx="2743200" cy="365125"/>
+          </a:xfrm>
+          <a:prstGeom prst="rect">
+            <a:avLst/>
+          </a:prstGeom>
+        </p:spPr>
         <p:txBody>
           <a:bodyPr/>
           <a:lstStyle/>
@@ -1664,7 +2123,7 @@
 </p:sldLayout>
 </file>
 
-<file path=ppt/slideLayouts/slideLayout6.xml><?xml version="1.0" encoding="utf-8"?>
+<file path=ppt/slideLayouts/slideLayout7.xml><?xml version="1.0" encoding="utf-8"?>
 <p:sldLayout xmlns:a="http://schemas.openxmlformats.org/drawingml/2006/main" xmlns:r="http://schemas.openxmlformats.org/officeDocument/2006/relationships" xmlns:p="http://schemas.openxmlformats.org/presentationml/2006/main" type="titleOnly" preserve="1">
   <p:cSld name="Title Only">
     <p:spTree>
@@ -1714,7 +2173,15 @@
             <p:ph type="dt" sz="half" idx="10"/>
           </p:nvPr>
         </p:nvSpPr>
-        <p:spPr/>
+        <p:spPr>
+          <a:xfrm>
+            <a:off x="838200" y="6356350"/>
+            <a:ext cx="2743200" cy="365125"/>
+          </a:xfrm>
+          <a:prstGeom prst="rect">
+            <a:avLst/>
+          </a:prstGeom>
+        </p:spPr>
         <p:txBody>
           <a:bodyPr/>
           <a:lstStyle/>
@@ -1737,7 +2204,15 @@
             <p:ph type="ftr" sz="quarter" idx="11"/>
           </p:nvPr>
         </p:nvSpPr>
-        <p:spPr/>
+        <p:spPr>
+          <a:xfrm>
+            <a:off x="4038600" y="6356350"/>
+            <a:ext cx="4114800" cy="365125"/>
+          </a:xfrm>
+          <a:prstGeom prst="rect">
+            <a:avLst/>
+          </a:prstGeom>
+        </p:spPr>
         <p:txBody>
           <a:bodyPr/>
           <a:lstStyle/>
@@ -1756,7 +2231,15 @@
             <p:ph type="sldNum" sz="quarter" idx="12"/>
           </p:nvPr>
         </p:nvSpPr>
-        <p:spPr/>
+        <p:spPr>
+          <a:xfrm>
+            <a:off x="8610600" y="6356350"/>
+            <a:ext cx="2743200" cy="365125"/>
+          </a:xfrm>
+          <a:prstGeom prst="rect">
+            <a:avLst/>
+          </a:prstGeom>
+        </p:spPr>
         <p:txBody>
           <a:bodyPr/>
           <a:lstStyle/>
@@ -1782,7 +2265,7 @@
 </p:sldLayout>
 </file>
 
-<file path=ppt/slideLayouts/slideLayout7.xml><?xml version="1.0" encoding="utf-8"?>
+<file path=ppt/slideLayouts/slideLayout8.xml><?xml version="1.0" encoding="utf-8"?>
 <p:sldLayout xmlns:a="http://schemas.openxmlformats.org/drawingml/2006/main" xmlns:r="http://schemas.openxmlformats.org/officeDocument/2006/relationships" xmlns:p="http://schemas.openxmlformats.org/presentationml/2006/main" type="blank" preserve="1">
   <p:cSld name="Blank">
     <p:spTree>
@@ -1809,7 +2292,15 @@
             <p:ph type="dt" sz="half" idx="10"/>
           </p:nvPr>
         </p:nvSpPr>
-        <p:spPr/>
+        <p:spPr>
+          <a:xfrm>
+            <a:off x="838200" y="6356350"/>
+            <a:ext cx="2743200" cy="365125"/>
+          </a:xfrm>
+          <a:prstGeom prst="rect">
+            <a:avLst/>
+          </a:prstGeom>
+        </p:spPr>
         <p:txBody>
           <a:bodyPr/>
           <a:lstStyle/>
@@ -1832,7 +2323,15 @@
             <p:ph type="ftr" sz="quarter" idx="11"/>
           </p:nvPr>
         </p:nvSpPr>
-        <p:spPr/>
+        <p:spPr>
+          <a:xfrm>
+            <a:off x="4038600" y="6356350"/>
+            <a:ext cx="4114800" cy="365125"/>
+          </a:xfrm>
+          <a:prstGeom prst="rect">
+            <a:avLst/>
+          </a:prstGeom>
+        </p:spPr>
         <p:txBody>
           <a:bodyPr/>
           <a:lstStyle/>
@@ -1851,7 +2350,15 @@
             <p:ph type="sldNum" sz="quarter" idx="12"/>
           </p:nvPr>
         </p:nvSpPr>
-        <p:spPr/>
+        <p:spPr>
+          <a:xfrm>
+            <a:off x="8610600" y="6356350"/>
+            <a:ext cx="2743200" cy="365125"/>
+          </a:xfrm>
+          <a:prstGeom prst="rect">
+            <a:avLst/>
+          </a:prstGeom>
+        </p:spPr>
         <p:txBody>
           <a:bodyPr/>
           <a:lstStyle/>
@@ -1877,7 +2384,7 @@
 </p:sldLayout>
 </file>
 
-<file path=ppt/slideLayouts/slideLayout8.xml><?xml version="1.0" encoding="utf-8"?>
+<file path=ppt/slideLayouts/slideLayout9.xml><?xml version="1.0" encoding="utf-8"?>
 <p:sldLayout xmlns:a="http://schemas.openxmlformats.org/drawingml/2006/main" xmlns:r="http://schemas.openxmlformats.org/officeDocument/2006/relationships" xmlns:p="http://schemas.openxmlformats.org/presentationml/2006/main" type="objTx" preserve="1">
   <p:cSld name="Content with Caption">
     <p:spTree>
@@ -2086,7 +2593,15 @@
             <p:ph type="dt" sz="half" idx="10"/>
           </p:nvPr>
         </p:nvSpPr>
-        <p:spPr/>
+        <p:spPr>
+          <a:xfrm>
+            <a:off x="838200" y="6356350"/>
+            <a:ext cx="2743200" cy="365125"/>
+          </a:xfrm>
+          <a:prstGeom prst="rect">
+            <a:avLst/>
+          </a:prstGeom>
+        </p:spPr>
         <p:txBody>
           <a:bodyPr/>
           <a:lstStyle/>
@@ -2109,7 +2624,15 @@
             <p:ph type="ftr" sz="quarter" idx="11"/>
           </p:nvPr>
         </p:nvSpPr>
-        <p:spPr/>
+        <p:spPr>
+          <a:xfrm>
+            <a:off x="4038600" y="6356350"/>
+            <a:ext cx="4114800" cy="365125"/>
+          </a:xfrm>
+          <a:prstGeom prst="rect">
+            <a:avLst/>
+          </a:prstGeom>
+        </p:spPr>
         <p:txBody>
           <a:bodyPr/>
           <a:lstStyle/>
@@ -2128,7 +2651,15 @@
             <p:ph type="sldNum" sz="quarter" idx="12"/>
           </p:nvPr>
         </p:nvSpPr>
-        <p:spPr/>
+        <p:spPr>
+          <a:xfrm>
+            <a:off x="8610600" y="6356350"/>
+            <a:ext cx="2743200" cy="365125"/>
+          </a:xfrm>
+          <a:prstGeom prst="rect">
+            <a:avLst/>
+          </a:prstGeom>
+        </p:spPr>
         <p:txBody>
           <a:bodyPr/>
           <a:lstStyle/>
@@ -2145,263 +2676,6 @@
     <p:extLst>
       <p:ext uri="{BB962C8B-B14F-4D97-AF65-F5344CB8AC3E}">
         <p14:creationId xmlns:p14="http://schemas.microsoft.com/office/powerpoint/2010/main" val="3252195724"/>
-      </p:ext>
-    </p:extLst>
-  </p:cSld>
-  <p:clrMapOvr>
-    <a:masterClrMapping/>
-  </p:clrMapOvr>
-</p:sldLayout>
-</file>
-
-<file path=ppt/slideLayouts/slideLayout9.xml><?xml version="1.0" encoding="utf-8"?>
-<p:sldLayout xmlns:a="http://schemas.openxmlformats.org/drawingml/2006/main" xmlns:r="http://schemas.openxmlformats.org/officeDocument/2006/relationships" xmlns:p="http://schemas.openxmlformats.org/presentationml/2006/main" type="picTx" preserve="1">
-  <p:cSld name="Picture with Caption">
-    <p:spTree>
-      <p:nvGrpSpPr>
-        <p:cNvPr id="1" name=""/>
-        <p:cNvGrpSpPr/>
-        <p:nvPr/>
-      </p:nvGrpSpPr>
-      <p:grpSpPr>
-        <a:xfrm>
-          <a:off x="0" y="0"/>
-          <a:ext cx="0" cy="0"/>
-          <a:chOff x="0" y="0"/>
-          <a:chExt cx="0" cy="0"/>
-        </a:xfrm>
-      </p:grpSpPr>
-      <p:sp>
-        <p:nvSpPr>
-          <p:cNvPr id="2" name="Title 1"/>
-          <p:cNvSpPr>
-            <a:spLocks noGrp="1"/>
-          </p:cNvSpPr>
-          <p:nvPr>
-            <p:ph type="title"/>
-          </p:nvPr>
-        </p:nvSpPr>
-        <p:spPr>
-          <a:xfrm>
-            <a:off x="839788" y="457200"/>
-            <a:ext cx="3932237" cy="1600200"/>
-          </a:xfrm>
-        </p:spPr>
-        <p:txBody>
-          <a:bodyPr anchor="b"/>
-          <a:lstStyle>
-            <a:lvl1pPr>
-              <a:defRPr sz="3200"/>
-            </a:lvl1pPr>
-          </a:lstStyle>
-          <a:p>
-            <a:r>
-              <a:rPr lang="en-US" smtClean="0"/>
-              <a:t>Click to edit Master title style</a:t>
-            </a:r>
-            <a:endParaRPr lang="en-US" dirty="0"/>
-          </a:p>
-        </p:txBody>
-      </p:sp>
-      <p:sp>
-        <p:nvSpPr>
-          <p:cNvPr id="3" name="Picture Placeholder 2"/>
-          <p:cNvSpPr>
-            <a:spLocks noGrp="1" noChangeAspect="1"/>
-          </p:cNvSpPr>
-          <p:nvPr>
-            <p:ph type="pic" idx="1"/>
-          </p:nvPr>
-        </p:nvSpPr>
-        <p:spPr>
-          <a:xfrm>
-            <a:off x="5183188" y="987425"/>
-            <a:ext cx="6172200" cy="4873625"/>
-          </a:xfrm>
-        </p:spPr>
-        <p:txBody>
-          <a:bodyPr anchor="t"/>
-          <a:lstStyle>
-            <a:lvl1pPr marL="0" indent="0">
-              <a:buNone/>
-              <a:defRPr sz="3200"/>
-            </a:lvl1pPr>
-            <a:lvl2pPr marL="457200" indent="0">
-              <a:buNone/>
-              <a:defRPr sz="2800"/>
-            </a:lvl2pPr>
-            <a:lvl3pPr marL="914400" indent="0">
-              <a:buNone/>
-              <a:defRPr sz="2400"/>
-            </a:lvl3pPr>
-            <a:lvl4pPr marL="1371600" indent="0">
-              <a:buNone/>
-              <a:defRPr sz="2000"/>
-            </a:lvl4pPr>
-            <a:lvl5pPr marL="1828800" indent="0">
-              <a:buNone/>
-              <a:defRPr sz="2000"/>
-            </a:lvl5pPr>
-            <a:lvl6pPr marL="2286000" indent="0">
-              <a:buNone/>
-              <a:defRPr sz="2000"/>
-            </a:lvl6pPr>
-            <a:lvl7pPr marL="2743200" indent="0">
-              <a:buNone/>
-              <a:defRPr sz="2000"/>
-            </a:lvl7pPr>
-            <a:lvl8pPr marL="3200400" indent="0">
-              <a:buNone/>
-              <a:defRPr sz="2000"/>
-            </a:lvl8pPr>
-            <a:lvl9pPr marL="3657600" indent="0">
-              <a:buNone/>
-              <a:defRPr sz="2000"/>
-            </a:lvl9pPr>
-          </a:lstStyle>
-          <a:p>
-            <a:r>
-              <a:rPr lang="en-US" smtClean="0"/>
-              <a:t>Click icon to add picture</a:t>
-            </a:r>
-            <a:endParaRPr lang="en-US" dirty="0"/>
-          </a:p>
-        </p:txBody>
-      </p:sp>
-      <p:sp>
-        <p:nvSpPr>
-          <p:cNvPr id="4" name="Text Placeholder 3"/>
-          <p:cNvSpPr>
-            <a:spLocks noGrp="1"/>
-          </p:cNvSpPr>
-          <p:nvPr>
-            <p:ph type="body" sz="half" idx="2"/>
-          </p:nvPr>
-        </p:nvSpPr>
-        <p:spPr>
-          <a:xfrm>
-            <a:off x="839788" y="2057400"/>
-            <a:ext cx="3932237" cy="3811588"/>
-          </a:xfrm>
-        </p:spPr>
-        <p:txBody>
-          <a:bodyPr/>
-          <a:lstStyle>
-            <a:lvl1pPr marL="0" indent="0">
-              <a:buNone/>
-              <a:defRPr sz="1600"/>
-            </a:lvl1pPr>
-            <a:lvl2pPr marL="457200" indent="0">
-              <a:buNone/>
-              <a:defRPr sz="1400"/>
-            </a:lvl2pPr>
-            <a:lvl3pPr marL="914400" indent="0">
-              <a:buNone/>
-              <a:defRPr sz="1200"/>
-            </a:lvl3pPr>
-            <a:lvl4pPr marL="1371600" indent="0">
-              <a:buNone/>
-              <a:defRPr sz="1000"/>
-            </a:lvl4pPr>
-            <a:lvl5pPr marL="1828800" indent="0">
-              <a:buNone/>
-              <a:defRPr sz="1000"/>
-            </a:lvl5pPr>
-            <a:lvl6pPr marL="2286000" indent="0">
-              <a:buNone/>
-              <a:defRPr sz="1000"/>
-            </a:lvl6pPr>
-            <a:lvl7pPr marL="2743200" indent="0">
-              <a:buNone/>
-              <a:defRPr sz="1000"/>
-            </a:lvl7pPr>
-            <a:lvl8pPr marL="3200400" indent="0">
-              <a:buNone/>
-              <a:defRPr sz="1000"/>
-            </a:lvl8pPr>
-            <a:lvl9pPr marL="3657600" indent="0">
-              <a:buNone/>
-              <a:defRPr sz="1000"/>
-            </a:lvl9pPr>
-          </a:lstStyle>
-          <a:p>
-            <a:pPr lvl="0"/>
-            <a:r>
-              <a:rPr lang="en-US" smtClean="0"/>
-              <a:t>Click to edit Master text styles</a:t>
-            </a:r>
-          </a:p>
-        </p:txBody>
-      </p:sp>
-      <p:sp>
-        <p:nvSpPr>
-          <p:cNvPr id="5" name="Date Placeholder 4"/>
-          <p:cNvSpPr>
-            <a:spLocks noGrp="1"/>
-          </p:cNvSpPr>
-          <p:nvPr>
-            <p:ph type="dt" sz="half" idx="10"/>
-          </p:nvPr>
-        </p:nvSpPr>
-        <p:spPr/>
-        <p:txBody>
-          <a:bodyPr/>
-          <a:lstStyle/>
-          <a:p>
-            <a:fld id="{9A8A9685-B642-46B5-BA92-403CC3BFBA0C}" type="datetimeFigureOut">
-              <a:rPr lang="en-US" smtClean="0"/>
-              <a:t>2/27/2014</a:t>
-            </a:fld>
-            <a:endParaRPr lang="en-US"/>
-          </a:p>
-        </p:txBody>
-      </p:sp>
-      <p:sp>
-        <p:nvSpPr>
-          <p:cNvPr id="6" name="Footer Placeholder 5"/>
-          <p:cNvSpPr>
-            <a:spLocks noGrp="1"/>
-          </p:cNvSpPr>
-          <p:nvPr>
-            <p:ph type="ftr" sz="quarter" idx="11"/>
-          </p:nvPr>
-        </p:nvSpPr>
-        <p:spPr/>
-        <p:txBody>
-          <a:bodyPr/>
-          <a:lstStyle/>
-          <a:p>
-            <a:endParaRPr lang="en-US"/>
-          </a:p>
-        </p:txBody>
-      </p:sp>
-      <p:sp>
-        <p:nvSpPr>
-          <p:cNvPr id="7" name="Slide Number Placeholder 6"/>
-          <p:cNvSpPr>
-            <a:spLocks noGrp="1"/>
-          </p:cNvSpPr>
-          <p:nvPr>
-            <p:ph type="sldNum" sz="quarter" idx="12"/>
-          </p:nvPr>
-        </p:nvSpPr>
-        <p:spPr/>
-        <p:txBody>
-          <a:bodyPr/>
-          <a:lstStyle/>
-          <a:p>
-            <a:fld id="{24779EAB-BB74-41CA-9DC0-7B4AA9362422}" type="slidenum">
-              <a:rPr lang="en-US" smtClean="0"/>
-              <a:t>‹#›</a:t>
-            </a:fld>
-            <a:endParaRPr lang="en-US"/>
-          </a:p>
-        </p:txBody>
-      </p:sp>
-    </p:spTree>
-    <p:extLst>
-      <p:ext uri="{BB962C8B-B14F-4D97-AF65-F5344CB8AC3E}">
-        <p14:creationId xmlns:p14="http://schemas.microsoft.com/office/powerpoint/2010/main" val="2917938030"/>
       </p:ext>
     </p:extLst>
   </p:cSld>
@@ -2528,125 +2802,6 @@
           </a:p>
         </p:txBody>
       </p:sp>
-      <p:sp>
-        <p:nvSpPr>
-          <p:cNvPr id="4" name="Date Placeholder 3"/>
-          <p:cNvSpPr>
-            <a:spLocks noGrp="1"/>
-          </p:cNvSpPr>
-          <p:nvPr>
-            <p:ph type="dt" sz="half" idx="2"/>
-          </p:nvPr>
-        </p:nvSpPr>
-        <p:spPr>
-          <a:xfrm>
-            <a:off x="838200" y="6356350"/>
-            <a:ext cx="2743200" cy="365125"/>
-          </a:xfrm>
-          <a:prstGeom prst="rect">
-            <a:avLst/>
-          </a:prstGeom>
-        </p:spPr>
-        <p:txBody>
-          <a:bodyPr vert="horz" lIns="91440" tIns="45720" rIns="91440" bIns="45720" rtlCol="0" anchor="ctr"/>
-          <a:lstStyle>
-            <a:lvl1pPr algn="l">
-              <a:defRPr sz="1200">
-                <a:solidFill>
-                  <a:schemeClr val="tx1">
-                    <a:tint val="75000"/>
-                  </a:schemeClr>
-                </a:solidFill>
-              </a:defRPr>
-            </a:lvl1pPr>
-          </a:lstStyle>
-          <a:p>
-            <a:fld id="{9A8A9685-B642-46B5-BA92-403CC3BFBA0C}" type="datetimeFigureOut">
-              <a:rPr lang="en-US" smtClean="0"/>
-              <a:t>2/27/2014</a:t>
-            </a:fld>
-            <a:endParaRPr lang="en-US"/>
-          </a:p>
-        </p:txBody>
-      </p:sp>
-      <p:sp>
-        <p:nvSpPr>
-          <p:cNvPr id="5" name="Footer Placeholder 4"/>
-          <p:cNvSpPr>
-            <a:spLocks noGrp="1"/>
-          </p:cNvSpPr>
-          <p:nvPr>
-            <p:ph type="ftr" sz="quarter" idx="3"/>
-          </p:nvPr>
-        </p:nvSpPr>
-        <p:spPr>
-          <a:xfrm>
-            <a:off x="4038600" y="6356350"/>
-            <a:ext cx="4114800" cy="365125"/>
-          </a:xfrm>
-          <a:prstGeom prst="rect">
-            <a:avLst/>
-          </a:prstGeom>
-        </p:spPr>
-        <p:txBody>
-          <a:bodyPr vert="horz" lIns="91440" tIns="45720" rIns="91440" bIns="45720" rtlCol="0" anchor="ctr"/>
-          <a:lstStyle>
-            <a:lvl1pPr algn="ctr">
-              <a:defRPr sz="1200">
-                <a:solidFill>
-                  <a:schemeClr val="tx1">
-                    <a:tint val="75000"/>
-                  </a:schemeClr>
-                </a:solidFill>
-              </a:defRPr>
-            </a:lvl1pPr>
-          </a:lstStyle>
-          <a:p>
-            <a:endParaRPr lang="en-US"/>
-          </a:p>
-        </p:txBody>
-      </p:sp>
-      <p:sp>
-        <p:nvSpPr>
-          <p:cNvPr id="6" name="Slide Number Placeholder 5"/>
-          <p:cNvSpPr>
-            <a:spLocks noGrp="1"/>
-          </p:cNvSpPr>
-          <p:nvPr>
-            <p:ph type="sldNum" sz="quarter" idx="4"/>
-          </p:nvPr>
-        </p:nvSpPr>
-        <p:spPr>
-          <a:xfrm>
-            <a:off x="8610600" y="6356350"/>
-            <a:ext cx="2743200" cy="365125"/>
-          </a:xfrm>
-          <a:prstGeom prst="rect">
-            <a:avLst/>
-          </a:prstGeom>
-        </p:spPr>
-        <p:txBody>
-          <a:bodyPr vert="horz" lIns="91440" tIns="45720" rIns="91440" bIns="45720" rtlCol="0" anchor="ctr"/>
-          <a:lstStyle>
-            <a:lvl1pPr algn="r">
-              <a:defRPr sz="1200">
-                <a:solidFill>
-                  <a:schemeClr val="tx1">
-                    <a:tint val="75000"/>
-                  </a:schemeClr>
-                </a:solidFill>
-              </a:defRPr>
-            </a:lvl1pPr>
-          </a:lstStyle>
-          <a:p>
-            <a:fld id="{24779EAB-BB74-41CA-9DC0-7B4AA9362422}" type="slidenum">
-              <a:rPr lang="en-US" smtClean="0"/>
-              <a:t>‹#›</a:t>
-            </a:fld>
-            <a:endParaRPr lang="en-US"/>
-          </a:p>
-        </p:txBody>
-      </p:sp>
     </p:spTree>
     <p:extLst>
       <p:ext uri="{BB962C8B-B14F-4D97-AF65-F5344CB8AC3E}">
@@ -2658,16 +2813,24 @@
   <p:sldLayoutIdLst>
     <p:sldLayoutId id="2147483673" r:id="rId1"/>
     <p:sldLayoutId id="2147483674" r:id="rId2"/>
-    <p:sldLayoutId id="2147483675" r:id="rId3"/>
-    <p:sldLayoutId id="2147483676" r:id="rId4"/>
-    <p:sldLayoutId id="2147483677" r:id="rId5"/>
-    <p:sldLayoutId id="2147483678" r:id="rId6"/>
-    <p:sldLayoutId id="2147483679" r:id="rId7"/>
-    <p:sldLayoutId id="2147483680" r:id="rId8"/>
-    <p:sldLayoutId id="2147483681" r:id="rId9"/>
-    <p:sldLayoutId id="2147483682" r:id="rId10"/>
-    <p:sldLayoutId id="2147483683" r:id="rId11"/>
+    <p:sldLayoutId id="2147483684" r:id="rId3"/>
+    <p:sldLayoutId id="2147483675" r:id="rId4"/>
+    <p:sldLayoutId id="2147483676" r:id="rId5"/>
+    <p:sldLayoutId id="2147483677" r:id="rId6"/>
+    <p:sldLayoutId id="2147483678" r:id="rId7"/>
+    <p:sldLayoutId id="2147483679" r:id="rId8"/>
+    <p:sldLayoutId id="2147483680" r:id="rId9"/>
+    <p:sldLayoutId id="2147483681" r:id="rId10"/>
+    <p:sldLayoutId id="2147483682" r:id="rId11"/>
+    <p:sldLayoutId id="2147483683" r:id="rId12"/>
   </p:sldLayoutIdLst>
+  <p:timing>
+    <p:tnLst>
+      <p:par>
+        <p:cTn id="1" dur="indefinite" restart="never" nodeType="tmRoot"/>
+      </p:par>
+    </p:tnLst>
+  </p:timing>
   <p:txStyles>
     <p:titleStyle>
       <a:lvl1pPr algn="l" defTabSz="914400" rtl="0" eaLnBrk="1" latinLnBrk="0" hangingPunct="1">
@@ -3017,7 +3180,12 @@
             <p:ph type="subTitle" idx="1"/>
           </p:nvPr>
         </p:nvSpPr>
-        <p:spPr/>
+        <p:spPr>
+          <a:xfrm>
+            <a:off x="1524000" y="4113027"/>
+            <a:ext cx="9144000" cy="1655762"/>
+          </a:xfrm>
+        </p:spPr>
         <p:txBody>
           <a:bodyPr/>
           <a:lstStyle/>
@@ -3051,6 +3219,2637 @@
     <p:extLst>
       <p:ext uri="{BB962C8B-B14F-4D97-AF65-F5344CB8AC3E}">
         <p14:creationId xmlns:p14="http://schemas.microsoft.com/office/powerpoint/2010/main" val="1146482497"/>
+      </p:ext>
+    </p:extLst>
+  </p:cSld>
+  <p:clrMapOvr>
+    <a:masterClrMapping/>
+  </p:clrMapOvr>
+  <p:timing>
+    <p:tnLst>
+      <p:par>
+        <p:cTn id="1" dur="indefinite" restart="never" nodeType="tmRoot"/>
+      </p:par>
+    </p:tnLst>
+  </p:timing>
+</p:sld>
+</file>
+
+<file path=ppt/slides/slide10.xml><?xml version="1.0" encoding="utf-8"?>
+<p:sld xmlns:a="http://schemas.openxmlformats.org/drawingml/2006/main" xmlns:r="http://schemas.openxmlformats.org/officeDocument/2006/relationships" xmlns:p="http://schemas.openxmlformats.org/presentationml/2006/main">
+  <p:cSld>
+    <p:spTree>
+      <p:nvGrpSpPr>
+        <p:cNvPr id="1" name=""/>
+        <p:cNvGrpSpPr/>
+        <p:nvPr/>
+      </p:nvGrpSpPr>
+      <p:grpSpPr>
+        <a:xfrm>
+          <a:off x="0" y="0"/>
+          <a:ext cx="0" cy="0"/>
+          <a:chOff x="0" y="0"/>
+          <a:chExt cx="0" cy="0"/>
+        </a:xfrm>
+      </p:grpSpPr>
+      <p:pic>
+        <p:nvPicPr>
+          <p:cNvPr id="7" name="Picture Placeholder 6"/>
+          <p:cNvPicPr>
+            <a:picLocks noGrp="1" noChangeAspect="1"/>
+          </p:cNvPicPr>
+          <p:nvPr>
+            <p:ph type="pic" sz="quarter" idx="11"/>
+          </p:nvPr>
+        </p:nvPicPr>
+        <p:blipFill>
+          <a:blip r:embed="rId2">
+            <a:extLst>
+              <a:ext uri="{28A0092B-C50C-407E-A947-70E740481C1C}">
+                <a14:useLocalDpi xmlns:a14="http://schemas.microsoft.com/office/drawing/2010/main" val="0"/>
+              </a:ext>
+            </a:extLst>
+          </a:blip>
+          <a:stretch>
+            <a:fillRect/>
+          </a:stretch>
+        </p:blipFill>
+        <p:spPr>
+          <a:xfrm>
+            <a:off x="0" y="1027906"/>
+            <a:ext cx="12192000" cy="5486400"/>
+          </a:xfrm>
+          <a:prstGeom prst="rect">
+            <a:avLst/>
+          </a:prstGeom>
+          <a:noFill/>
+          <a:ln>
+            <a:noFill/>
+          </a:ln>
+        </p:spPr>
+      </p:pic>
+      <p:sp>
+        <p:nvSpPr>
+          <p:cNvPr id="3" name="Title 2"/>
+          <p:cNvSpPr>
+            <a:spLocks noGrp="1"/>
+          </p:cNvSpPr>
+          <p:nvPr>
+            <p:ph type="title"/>
+          </p:nvPr>
+        </p:nvSpPr>
+        <p:spPr/>
+        <p:txBody>
+          <a:bodyPr/>
+          <a:lstStyle/>
+          <a:p>
+            <a:r>
+              <a:rPr lang="en-US" dirty="0" smtClean="0"/>
+              <a:t>&gt; 90% of code is borrowed or shared</a:t>
+            </a:r>
+            <a:endParaRPr lang="en-US" dirty="0"/>
+          </a:p>
+        </p:txBody>
+      </p:sp>
+      <p:sp>
+        <p:nvSpPr>
+          <p:cNvPr id="4" name="Text Placeholder 3"/>
+          <p:cNvSpPr>
+            <a:spLocks noGrp="1"/>
+          </p:cNvSpPr>
+          <p:nvPr>
+            <p:ph type="body" sz="quarter" idx="10"/>
+          </p:nvPr>
+        </p:nvSpPr>
+        <p:spPr/>
+        <p:txBody>
+          <a:bodyPr/>
+          <a:lstStyle/>
+          <a:p>
+            <a:r>
+              <a:rPr lang="en-US" dirty="0" smtClean="0"/>
+              <a:t>Facebook</a:t>
+            </a:r>
+            <a:endParaRPr lang="en-US" dirty="0"/>
+          </a:p>
+        </p:txBody>
+      </p:sp>
+    </p:spTree>
+    <p:extLst>
+      <p:ext uri="{BB962C8B-B14F-4D97-AF65-F5344CB8AC3E}">
+        <p14:creationId xmlns:p14="http://schemas.microsoft.com/office/powerpoint/2010/main" val="370344924"/>
+      </p:ext>
+    </p:extLst>
+  </p:cSld>
+  <p:clrMapOvr>
+    <a:masterClrMapping/>
+  </p:clrMapOvr>
+  <p:timing>
+    <p:tnLst>
+      <p:par>
+        <p:cTn id="1" dur="indefinite" restart="never" nodeType="tmRoot"/>
+      </p:par>
+    </p:tnLst>
+  </p:timing>
+</p:sld>
+</file>
+
+<file path=ppt/slides/slide11.xml><?xml version="1.0" encoding="utf-8"?>
+<p:sld xmlns:a="http://schemas.openxmlformats.org/drawingml/2006/main" xmlns:r="http://schemas.openxmlformats.org/officeDocument/2006/relationships" xmlns:p="http://schemas.openxmlformats.org/presentationml/2006/main">
+  <p:cSld>
+    <p:spTree>
+      <p:nvGrpSpPr>
+        <p:cNvPr id="1" name=""/>
+        <p:cNvGrpSpPr/>
+        <p:nvPr/>
+      </p:nvGrpSpPr>
+      <p:grpSpPr>
+        <a:xfrm>
+          <a:off x="0" y="0"/>
+          <a:ext cx="0" cy="0"/>
+          <a:chOff x="0" y="0"/>
+          <a:chExt cx="0" cy="0"/>
+        </a:xfrm>
+      </p:grpSpPr>
+      <p:pic>
+        <p:nvPicPr>
+          <p:cNvPr id="5" name="Picture Placeholder 4"/>
+          <p:cNvPicPr>
+            <a:picLocks noGrp="1" noChangeAspect="1"/>
+          </p:cNvPicPr>
+          <p:nvPr>
+            <p:ph type="pic" sz="quarter" idx="11"/>
+          </p:nvPr>
+        </p:nvPicPr>
+        <p:blipFill>
+          <a:blip r:embed="rId2">
+            <a:extLst>
+              <a:ext uri="{28A0092B-C50C-407E-A947-70E740481C1C}">
+                <a14:useLocalDpi xmlns:a14="http://schemas.microsoft.com/office/drawing/2010/main" val="0"/>
+              </a:ext>
+            </a:extLst>
+          </a:blip>
+          <a:srcRect t="7643" b="7643"/>
+          <a:stretch>
+            <a:fillRect/>
+          </a:stretch>
+        </p:blipFill>
+        <p:spPr/>
+      </p:pic>
+      <p:sp>
+        <p:nvSpPr>
+          <p:cNvPr id="3" name="Title 2"/>
+          <p:cNvSpPr>
+            <a:spLocks noGrp="1"/>
+          </p:cNvSpPr>
+          <p:nvPr>
+            <p:ph type="title"/>
+          </p:nvPr>
+        </p:nvSpPr>
+        <p:spPr/>
+        <p:txBody>
+          <a:bodyPr/>
+          <a:lstStyle/>
+          <a:p>
+            <a:r>
+              <a:rPr lang="en-US" dirty="0" smtClean="0"/>
+              <a:t>Ship option hourly or faster</a:t>
+            </a:r>
+            <a:endParaRPr lang="en-US" dirty="0"/>
+          </a:p>
+        </p:txBody>
+      </p:sp>
+      <p:sp>
+        <p:nvSpPr>
+          <p:cNvPr id="4" name="Text Placeholder 3"/>
+          <p:cNvSpPr>
+            <a:spLocks noGrp="1"/>
+          </p:cNvSpPr>
+          <p:nvPr>
+            <p:ph type="body" sz="quarter" idx="10"/>
+          </p:nvPr>
+        </p:nvSpPr>
+        <p:spPr/>
+        <p:txBody>
+          <a:bodyPr/>
+          <a:lstStyle/>
+          <a:p>
+            <a:r>
+              <a:rPr lang="en-US" dirty="0" smtClean="0"/>
+              <a:t>Flickr</a:t>
+            </a:r>
+            <a:endParaRPr lang="en-US" dirty="0"/>
+          </a:p>
+        </p:txBody>
+      </p:sp>
+    </p:spTree>
+    <p:extLst>
+      <p:ext uri="{BB962C8B-B14F-4D97-AF65-F5344CB8AC3E}">
+        <p14:creationId xmlns:p14="http://schemas.microsoft.com/office/powerpoint/2010/main" val="31101744"/>
+      </p:ext>
+    </p:extLst>
+  </p:cSld>
+  <p:clrMapOvr>
+    <a:masterClrMapping/>
+  </p:clrMapOvr>
+  <p:timing>
+    <p:tnLst>
+      <p:par>
+        <p:cTn id="1" dur="indefinite" restart="never" nodeType="tmRoot"/>
+      </p:par>
+    </p:tnLst>
+  </p:timing>
+</p:sld>
+</file>
+
+<file path=ppt/slides/slide12.xml><?xml version="1.0" encoding="utf-8"?>
+<p:sld xmlns:a="http://schemas.openxmlformats.org/drawingml/2006/main" xmlns:r="http://schemas.openxmlformats.org/officeDocument/2006/relationships" xmlns:p="http://schemas.openxmlformats.org/presentationml/2006/main">
+  <p:cSld>
+    <p:spTree>
+      <p:nvGrpSpPr>
+        <p:cNvPr id="1" name=""/>
+        <p:cNvGrpSpPr/>
+        <p:nvPr/>
+      </p:nvGrpSpPr>
+      <p:grpSpPr>
+        <a:xfrm>
+          <a:off x="0" y="0"/>
+          <a:ext cx="0" cy="0"/>
+          <a:chOff x="0" y="0"/>
+          <a:chExt cx="0" cy="0"/>
+        </a:xfrm>
+      </p:grpSpPr>
+      <p:pic>
+        <p:nvPicPr>
+          <p:cNvPr id="5" name="Picture Placeholder 4"/>
+          <p:cNvPicPr>
+            <a:picLocks noGrp="1" noChangeAspect="1"/>
+          </p:cNvPicPr>
+          <p:nvPr>
+            <p:ph type="pic" sz="quarter" idx="11"/>
+          </p:nvPr>
+        </p:nvPicPr>
+        <p:blipFill>
+          <a:blip r:embed="rId2">
+            <a:extLst>
+              <a:ext uri="{28A0092B-C50C-407E-A947-70E740481C1C}">
+                <a14:useLocalDpi xmlns:a14="http://schemas.microsoft.com/office/drawing/2010/main" val="0"/>
+              </a:ext>
+            </a:extLst>
+          </a:blip>
+          <a:srcRect t="12467" b="12467"/>
+          <a:stretch>
+            <a:fillRect/>
+          </a:stretch>
+        </p:blipFill>
+        <p:spPr/>
+      </p:pic>
+      <p:sp>
+        <p:nvSpPr>
+          <p:cNvPr id="3" name="Title 2"/>
+          <p:cNvSpPr>
+            <a:spLocks noGrp="1"/>
+          </p:cNvSpPr>
+          <p:nvPr>
+            <p:ph type="title"/>
+          </p:nvPr>
+        </p:nvSpPr>
+        <p:spPr/>
+        <p:txBody>
+          <a:bodyPr/>
+          <a:lstStyle/>
+          <a:p>
+            <a:r>
+              <a:rPr lang="en-US" dirty="0" smtClean="0"/>
+              <a:t>All stakeholders involved from start</a:t>
+            </a:r>
+            <a:endParaRPr lang="en-US" dirty="0"/>
+          </a:p>
+        </p:txBody>
+      </p:sp>
+      <p:sp>
+        <p:nvSpPr>
+          <p:cNvPr id="4" name="Text Placeholder 3"/>
+          <p:cNvSpPr>
+            <a:spLocks noGrp="1"/>
+          </p:cNvSpPr>
+          <p:nvPr>
+            <p:ph type="body" sz="quarter" idx="10"/>
+          </p:nvPr>
+        </p:nvSpPr>
+        <p:spPr/>
+        <p:txBody>
+          <a:bodyPr/>
+          <a:lstStyle/>
+          <a:p>
+            <a:r>
+              <a:rPr lang="en-US" dirty="0" smtClean="0"/>
+              <a:t>Merrill Lynch</a:t>
+            </a:r>
+            <a:endParaRPr lang="en-US" dirty="0"/>
+          </a:p>
+        </p:txBody>
+      </p:sp>
+    </p:spTree>
+    <p:extLst>
+      <p:ext uri="{BB962C8B-B14F-4D97-AF65-F5344CB8AC3E}">
+        <p14:creationId xmlns:p14="http://schemas.microsoft.com/office/powerpoint/2010/main" val="3445433610"/>
+      </p:ext>
+    </p:extLst>
+  </p:cSld>
+  <p:clrMapOvr>
+    <a:masterClrMapping/>
+  </p:clrMapOvr>
+  <p:timing>
+    <p:tnLst>
+      <p:par>
+        <p:cTn id="1" dur="indefinite" restart="never" nodeType="tmRoot"/>
+      </p:par>
+    </p:tnLst>
+  </p:timing>
+</p:sld>
+</file>
+
+<file path=ppt/slides/slide13.xml><?xml version="1.0" encoding="utf-8"?>
+<p:sld xmlns:a="http://schemas.openxmlformats.org/drawingml/2006/main" xmlns:r="http://schemas.openxmlformats.org/officeDocument/2006/relationships" xmlns:p="http://schemas.openxmlformats.org/presentationml/2006/main">
+  <p:cSld>
+    <p:spTree>
+      <p:nvGrpSpPr>
+        <p:cNvPr id="1" name=""/>
+        <p:cNvGrpSpPr/>
+        <p:nvPr/>
+      </p:nvGrpSpPr>
+      <p:grpSpPr>
+        <a:xfrm>
+          <a:off x="0" y="0"/>
+          <a:ext cx="0" cy="0"/>
+          <a:chOff x="0" y="0"/>
+          <a:chExt cx="0" cy="0"/>
+        </a:xfrm>
+      </p:grpSpPr>
+      <p:pic>
+        <p:nvPicPr>
+          <p:cNvPr id="5" name="Picture Placeholder 4"/>
+          <p:cNvPicPr>
+            <a:picLocks noGrp="1" noChangeAspect="1"/>
+          </p:cNvPicPr>
+          <p:nvPr>
+            <p:ph type="pic" sz="quarter" idx="11"/>
+          </p:nvPr>
+        </p:nvPicPr>
+        <p:blipFill>
+          <a:blip r:embed="rId2">
+            <a:extLst>
+              <a:ext uri="{28A0092B-C50C-407E-A947-70E740481C1C}">
+                <a14:useLocalDpi xmlns:a14="http://schemas.microsoft.com/office/drawing/2010/main" val="0"/>
+              </a:ext>
+            </a:extLst>
+          </a:blip>
+          <a:srcRect t="12500" b="12500"/>
+          <a:stretch>
+            <a:fillRect/>
+          </a:stretch>
+        </p:blipFill>
+        <p:spPr/>
+      </p:pic>
+      <p:sp>
+        <p:nvSpPr>
+          <p:cNvPr id="3" name="Title 2"/>
+          <p:cNvSpPr>
+            <a:spLocks noGrp="1"/>
+          </p:cNvSpPr>
+          <p:nvPr>
+            <p:ph type="title"/>
+          </p:nvPr>
+        </p:nvSpPr>
+        <p:spPr/>
+        <p:txBody>
+          <a:bodyPr/>
+          <a:lstStyle/>
+          <a:p>
+            <a:r>
+              <a:rPr lang="en-US" dirty="0" smtClean="0"/>
+              <a:t>Transparent and invite decision collaboration</a:t>
+            </a:r>
+            <a:endParaRPr lang="en-US" dirty="0"/>
+          </a:p>
+        </p:txBody>
+      </p:sp>
+      <p:sp>
+        <p:nvSpPr>
+          <p:cNvPr id="4" name="Text Placeholder 3"/>
+          <p:cNvSpPr>
+            <a:spLocks noGrp="1"/>
+          </p:cNvSpPr>
+          <p:nvPr>
+            <p:ph type="body" sz="quarter" idx="10"/>
+          </p:nvPr>
+        </p:nvSpPr>
+        <p:spPr/>
+        <p:txBody>
+          <a:bodyPr/>
+          <a:lstStyle/>
+          <a:p>
+            <a:r>
+              <a:rPr lang="en-US" dirty="0" smtClean="0"/>
+              <a:t>Yammer – annual budgeting</a:t>
+            </a:r>
+            <a:endParaRPr lang="en-US" dirty="0"/>
+          </a:p>
+        </p:txBody>
+      </p:sp>
+    </p:spTree>
+    <p:extLst>
+      <p:ext uri="{BB962C8B-B14F-4D97-AF65-F5344CB8AC3E}">
+        <p14:creationId xmlns:p14="http://schemas.microsoft.com/office/powerpoint/2010/main" val="3245046332"/>
+      </p:ext>
+    </p:extLst>
+  </p:cSld>
+  <p:clrMapOvr>
+    <a:masterClrMapping/>
+  </p:clrMapOvr>
+  <p:timing>
+    <p:tnLst>
+      <p:par>
+        <p:cTn id="1" dur="indefinite" restart="never" nodeType="tmRoot"/>
+      </p:par>
+    </p:tnLst>
+  </p:timing>
+</p:sld>
+</file>
+
+<file path=ppt/slides/slide14.xml><?xml version="1.0" encoding="utf-8"?>
+<p:sld xmlns:a="http://schemas.openxmlformats.org/drawingml/2006/main" xmlns:r="http://schemas.openxmlformats.org/officeDocument/2006/relationships" xmlns:p="http://schemas.openxmlformats.org/presentationml/2006/main">
+  <p:cSld>
+    <p:spTree>
+      <p:nvGrpSpPr>
+        <p:cNvPr id="1" name=""/>
+        <p:cNvGrpSpPr/>
+        <p:nvPr/>
+      </p:nvGrpSpPr>
+      <p:grpSpPr>
+        <a:xfrm>
+          <a:off x="0" y="0"/>
+          <a:ext cx="0" cy="0"/>
+          <a:chOff x="0" y="0"/>
+          <a:chExt cx="0" cy="0"/>
+        </a:xfrm>
+      </p:grpSpPr>
+      <p:sp>
+        <p:nvSpPr>
+          <p:cNvPr id="2" name="Title 1"/>
+          <p:cNvSpPr>
+            <a:spLocks noGrp="1"/>
+          </p:cNvSpPr>
+          <p:nvPr>
+            <p:ph type="title"/>
+          </p:nvPr>
+        </p:nvSpPr>
+        <p:spPr/>
+        <p:txBody>
+          <a:bodyPr/>
+          <a:lstStyle/>
+          <a:p>
+            <a:r>
+              <a:rPr lang="en-US" dirty="0" smtClean="0"/>
+              <a:t>Average 2-star results - Discipline</a:t>
+            </a:r>
+            <a:endParaRPr lang="en-US" dirty="0"/>
+          </a:p>
+        </p:txBody>
+      </p:sp>
+      <p:sp>
+        <p:nvSpPr>
+          <p:cNvPr id="3" name="Content Placeholder 2"/>
+          <p:cNvSpPr>
+            <a:spLocks noGrp="1"/>
+          </p:cNvSpPr>
+          <p:nvPr>
+            <p:ph idx="1"/>
+          </p:nvPr>
+        </p:nvSpPr>
+        <p:spPr/>
+        <p:txBody>
+          <a:bodyPr>
+            <a:normAutofit fontScale="85000" lnSpcReduction="20000"/>
+          </a:bodyPr>
+          <a:lstStyle/>
+          <a:p>
+            <a:r>
+              <a:rPr lang="en-US" dirty="0" smtClean="0"/>
+              <a:t>Write &lt; 1 bug per fortnight per team</a:t>
+            </a:r>
+          </a:p>
+          <a:p>
+            <a:r>
+              <a:rPr lang="en-US" dirty="0" smtClean="0"/>
+              <a:t>Bug DB median size is 0; max is 1</a:t>
+            </a:r>
+          </a:p>
+          <a:p>
+            <a:r>
+              <a:rPr lang="en-US" dirty="0" smtClean="0"/>
+              <a:t>Finish &gt; 95% of work within +/- 5% of prediction</a:t>
+            </a:r>
+          </a:p>
+          <a:p>
+            <a:r>
+              <a:rPr lang="en-US" dirty="0" smtClean="0"/>
+              <a:t>Can prioritize work based on value alone</a:t>
+            </a:r>
+          </a:p>
+          <a:p>
+            <a:r>
+              <a:rPr lang="en-US" dirty="0" smtClean="0"/>
+              <a:t>Every work item can be done by anyone</a:t>
+            </a:r>
+          </a:p>
+          <a:p>
+            <a:r>
+              <a:rPr lang="en-US" dirty="0" smtClean="0"/>
+              <a:t>35% </a:t>
+            </a:r>
+            <a:r>
+              <a:rPr lang="en-US" dirty="0" err="1" smtClean="0"/>
+              <a:t>YoY</a:t>
+            </a:r>
+            <a:r>
+              <a:rPr lang="en-US" dirty="0" smtClean="0"/>
+              <a:t> productivity gain</a:t>
+            </a:r>
+          </a:p>
+          <a:p>
+            <a:r>
+              <a:rPr lang="en-US" dirty="0" smtClean="0"/>
+              <a:t>Legacy code gives 3x productivity boost</a:t>
+            </a:r>
+          </a:p>
+          <a:p>
+            <a:r>
+              <a:rPr lang="en-US" dirty="0" smtClean="0"/>
+              <a:t>90% of the code is borrowed / shared</a:t>
+            </a:r>
+          </a:p>
+          <a:p>
+            <a:r>
+              <a:rPr lang="en-US" dirty="0" smtClean="0"/>
+              <a:t>Ship option hourly or faster</a:t>
+            </a:r>
+          </a:p>
+          <a:p>
+            <a:r>
+              <a:rPr lang="en-US" dirty="0" smtClean="0"/>
+              <a:t>All stakeholders involved from start</a:t>
+            </a:r>
+          </a:p>
+          <a:p>
+            <a:r>
+              <a:rPr lang="en-US" dirty="0" smtClean="0"/>
+              <a:t>Transparent and invite decision collaboration</a:t>
+            </a:r>
+            <a:endParaRPr lang="en-US" dirty="0"/>
+          </a:p>
+        </p:txBody>
+      </p:sp>
+      <p:sp>
+        <p:nvSpPr>
+          <p:cNvPr id="5" name="Rectangle 4"/>
+          <p:cNvSpPr/>
+          <p:nvPr/>
+        </p:nvSpPr>
+        <p:spPr>
+          <a:xfrm>
+            <a:off x="8516471" y="1771651"/>
+            <a:ext cx="3092823" cy="4180914"/>
+          </a:xfrm>
+          <a:prstGeom prst="rect">
+            <a:avLst/>
+          </a:prstGeom>
+        </p:spPr>
+        <p:style>
+          <a:lnRef idx="2">
+            <a:schemeClr val="accent1">
+              <a:shade val="50000"/>
+            </a:schemeClr>
+          </a:lnRef>
+          <a:fillRef idx="1">
+            <a:schemeClr val="accent1"/>
+          </a:fillRef>
+          <a:effectRef idx="0">
+            <a:schemeClr val="accent1"/>
+          </a:effectRef>
+          <a:fontRef idx="minor">
+            <a:schemeClr val="lt1"/>
+          </a:fontRef>
+        </p:style>
+        <p:txBody>
+          <a:bodyPr rtlCol="0" anchor="ctr"/>
+          <a:lstStyle/>
+          <a:p>
+            <a:pPr algn="ctr"/>
+            <a:r>
+              <a:rPr lang="en-US" sz="4000" dirty="0" smtClean="0"/>
+              <a:t>Change direction on a dime with no sunk costs</a:t>
+            </a:r>
+            <a:endParaRPr lang="en-US" sz="4000" dirty="0"/>
+          </a:p>
+        </p:txBody>
+      </p:sp>
+    </p:spTree>
+    <p:extLst>
+      <p:ext uri="{BB962C8B-B14F-4D97-AF65-F5344CB8AC3E}">
+        <p14:creationId xmlns:p14="http://schemas.microsoft.com/office/powerpoint/2010/main" val="2254639955"/>
+      </p:ext>
+    </p:extLst>
+  </p:cSld>
+  <p:clrMapOvr>
+    <a:masterClrMapping/>
+  </p:clrMapOvr>
+  <p:timing>
+    <p:tnLst>
+      <p:par>
+        <p:cTn id="1" dur="indefinite" restart="never" nodeType="tmRoot"/>
+      </p:par>
+    </p:tnLst>
+  </p:timing>
+</p:sld>
+</file>
+
+<file path=ppt/slides/slide15.xml><?xml version="1.0" encoding="utf-8"?>
+<p:sld xmlns:a="http://schemas.openxmlformats.org/drawingml/2006/main" xmlns:r="http://schemas.openxmlformats.org/officeDocument/2006/relationships" xmlns:p="http://schemas.openxmlformats.org/presentationml/2006/main">
+  <p:cSld>
+    <p:spTree>
+      <p:nvGrpSpPr>
+        <p:cNvPr id="1" name=""/>
+        <p:cNvGrpSpPr/>
+        <p:nvPr/>
+      </p:nvGrpSpPr>
+      <p:grpSpPr>
+        <a:xfrm>
+          <a:off x="0" y="0"/>
+          <a:ext cx="0" cy="0"/>
+          <a:chOff x="0" y="0"/>
+          <a:chExt cx="0" cy="0"/>
+        </a:xfrm>
+      </p:grpSpPr>
+      <p:pic>
+        <p:nvPicPr>
+          <p:cNvPr id="7" name="Picture Placeholder 6"/>
+          <p:cNvPicPr>
+            <a:picLocks noGrp="1" noChangeAspect="1"/>
+          </p:cNvPicPr>
+          <p:nvPr>
+            <p:ph type="pic" sz="quarter" idx="11"/>
+          </p:nvPr>
+        </p:nvPicPr>
+        <p:blipFill>
+          <a:blip r:embed="rId2">
+            <a:extLst>
+              <a:ext uri="{28A0092B-C50C-407E-A947-70E740481C1C}">
+                <a14:useLocalDpi xmlns:a14="http://schemas.microsoft.com/office/drawing/2010/main" val="0"/>
+              </a:ext>
+            </a:extLst>
+          </a:blip>
+          <a:srcRect t="7869" b="7869"/>
+          <a:stretch>
+            <a:fillRect/>
+          </a:stretch>
+        </p:blipFill>
+        <p:spPr/>
+      </p:pic>
+      <p:sp>
+        <p:nvSpPr>
+          <p:cNvPr id="4" name="Title 3"/>
+          <p:cNvSpPr>
+            <a:spLocks noGrp="1"/>
+          </p:cNvSpPr>
+          <p:nvPr>
+            <p:ph type="title"/>
+          </p:nvPr>
+        </p:nvSpPr>
+        <p:spPr/>
+        <p:txBody>
+          <a:bodyPr/>
+          <a:lstStyle/>
+          <a:p>
+            <a:r>
+              <a:rPr lang="en-US" dirty="0" smtClean="0"/>
+              <a:t>Metrics-driven development</a:t>
+            </a:r>
+            <a:endParaRPr lang="en-US" dirty="0"/>
+          </a:p>
+        </p:txBody>
+      </p:sp>
+      <p:sp>
+        <p:nvSpPr>
+          <p:cNvPr id="5" name="Text Placeholder 4"/>
+          <p:cNvSpPr>
+            <a:spLocks noGrp="1"/>
+          </p:cNvSpPr>
+          <p:nvPr>
+            <p:ph type="body" sz="quarter" idx="10"/>
+          </p:nvPr>
+        </p:nvSpPr>
+        <p:spPr/>
+        <p:txBody>
+          <a:bodyPr/>
+          <a:lstStyle/>
+          <a:p>
+            <a:r>
+              <a:rPr lang="en-US" dirty="0" smtClean="0"/>
+              <a:t>Yammer</a:t>
+            </a:r>
+            <a:endParaRPr lang="en-US" dirty="0"/>
+          </a:p>
+        </p:txBody>
+      </p:sp>
+    </p:spTree>
+    <p:extLst>
+      <p:ext uri="{BB962C8B-B14F-4D97-AF65-F5344CB8AC3E}">
+        <p14:creationId xmlns:p14="http://schemas.microsoft.com/office/powerpoint/2010/main" val="207755436"/>
+      </p:ext>
+    </p:extLst>
+  </p:cSld>
+  <p:clrMapOvr>
+    <a:masterClrMapping/>
+  </p:clrMapOvr>
+  <p:timing>
+    <p:tnLst>
+      <p:par>
+        <p:cTn id="1" dur="indefinite" restart="never" nodeType="tmRoot"/>
+      </p:par>
+    </p:tnLst>
+  </p:timing>
+</p:sld>
+</file>
+
+<file path=ppt/slides/slide16.xml><?xml version="1.0" encoding="utf-8"?>
+<p:sld xmlns:a="http://schemas.openxmlformats.org/drawingml/2006/main" xmlns:r="http://schemas.openxmlformats.org/officeDocument/2006/relationships" xmlns:p="http://schemas.openxmlformats.org/presentationml/2006/main">
+  <p:cSld>
+    <p:spTree>
+      <p:nvGrpSpPr>
+        <p:cNvPr id="1" name=""/>
+        <p:cNvGrpSpPr/>
+        <p:nvPr/>
+      </p:nvGrpSpPr>
+      <p:grpSpPr>
+        <a:xfrm>
+          <a:off x="0" y="0"/>
+          <a:ext cx="0" cy="0"/>
+          <a:chOff x="0" y="0"/>
+          <a:chExt cx="0" cy="0"/>
+        </a:xfrm>
+      </p:grpSpPr>
+      <p:sp>
+        <p:nvSpPr>
+          <p:cNvPr id="2" name="Picture Placeholder 1"/>
+          <p:cNvSpPr>
+            <a:spLocks noGrp="1"/>
+          </p:cNvSpPr>
+          <p:nvPr>
+            <p:ph type="pic" sz="quarter" idx="11"/>
+          </p:nvPr>
+        </p:nvSpPr>
+        <p:spPr/>
+      </p:sp>
+      <p:sp>
+        <p:nvSpPr>
+          <p:cNvPr id="3" name="Title 2"/>
+          <p:cNvSpPr>
+            <a:spLocks noGrp="1"/>
+          </p:cNvSpPr>
+          <p:nvPr>
+            <p:ph type="title"/>
+          </p:nvPr>
+        </p:nvSpPr>
+        <p:spPr/>
+        <p:txBody>
+          <a:bodyPr/>
+          <a:lstStyle/>
+          <a:p>
+            <a:r>
+              <a:rPr lang="en-US" dirty="0" smtClean="0"/>
+              <a:t>Hypothesis-driven development</a:t>
+            </a:r>
+            <a:endParaRPr lang="en-US" dirty="0"/>
+          </a:p>
+        </p:txBody>
+      </p:sp>
+      <p:sp>
+        <p:nvSpPr>
+          <p:cNvPr id="4" name="Text Placeholder 3"/>
+          <p:cNvSpPr>
+            <a:spLocks noGrp="1"/>
+          </p:cNvSpPr>
+          <p:nvPr>
+            <p:ph type="body" sz="quarter" idx="10"/>
+          </p:nvPr>
+        </p:nvSpPr>
+        <p:spPr/>
+        <p:txBody>
+          <a:bodyPr/>
+          <a:lstStyle/>
+          <a:p>
+            <a:r>
+              <a:rPr lang="en-US" dirty="0" smtClean="0"/>
+              <a:t>Lean startup</a:t>
+            </a:r>
+            <a:endParaRPr lang="en-US" dirty="0"/>
+          </a:p>
+        </p:txBody>
+      </p:sp>
+    </p:spTree>
+    <p:extLst>
+      <p:ext uri="{BB962C8B-B14F-4D97-AF65-F5344CB8AC3E}">
+        <p14:creationId xmlns:p14="http://schemas.microsoft.com/office/powerpoint/2010/main" val="2850888470"/>
+      </p:ext>
+    </p:extLst>
+  </p:cSld>
+  <p:clrMapOvr>
+    <a:masterClrMapping/>
+  </p:clrMapOvr>
+  <p:timing>
+    <p:tnLst>
+      <p:par>
+        <p:cTn id="1" dur="indefinite" restart="never" nodeType="tmRoot"/>
+      </p:par>
+    </p:tnLst>
+  </p:timing>
+</p:sld>
+</file>
+
+<file path=ppt/slides/slide17.xml><?xml version="1.0" encoding="utf-8"?>
+<p:sld xmlns:a="http://schemas.openxmlformats.org/drawingml/2006/main" xmlns:r="http://schemas.openxmlformats.org/officeDocument/2006/relationships" xmlns:p="http://schemas.openxmlformats.org/presentationml/2006/main">
+  <p:cSld>
+    <p:spTree>
+      <p:nvGrpSpPr>
+        <p:cNvPr id="1" name=""/>
+        <p:cNvGrpSpPr/>
+        <p:nvPr/>
+      </p:nvGrpSpPr>
+      <p:grpSpPr>
+        <a:xfrm>
+          <a:off x="0" y="0"/>
+          <a:ext cx="0" cy="0"/>
+          <a:chOff x="0" y="0"/>
+          <a:chExt cx="0" cy="0"/>
+        </a:xfrm>
+      </p:grpSpPr>
+      <p:sp>
+        <p:nvSpPr>
+          <p:cNvPr id="2" name="Picture Placeholder 1"/>
+          <p:cNvSpPr>
+            <a:spLocks noGrp="1"/>
+          </p:cNvSpPr>
+          <p:nvPr>
+            <p:ph type="pic" sz="quarter" idx="11"/>
+          </p:nvPr>
+        </p:nvSpPr>
+        <p:spPr/>
+      </p:sp>
+      <p:sp>
+        <p:nvSpPr>
+          <p:cNvPr id="3" name="Title 2"/>
+          <p:cNvSpPr>
+            <a:spLocks noGrp="1"/>
+          </p:cNvSpPr>
+          <p:nvPr>
+            <p:ph type="title"/>
+          </p:nvPr>
+        </p:nvSpPr>
+        <p:spPr/>
+        <p:txBody>
+          <a:bodyPr/>
+          <a:lstStyle/>
+          <a:p>
+            <a:r>
+              <a:rPr lang="en-US" dirty="0" smtClean="0"/>
+              <a:t>Customer development / design thinking</a:t>
+            </a:r>
+            <a:endParaRPr lang="en-US" dirty="0"/>
+          </a:p>
+        </p:txBody>
+      </p:sp>
+      <p:sp>
+        <p:nvSpPr>
+          <p:cNvPr id="4" name="Text Placeholder 3"/>
+          <p:cNvSpPr>
+            <a:spLocks noGrp="1"/>
+          </p:cNvSpPr>
+          <p:nvPr>
+            <p:ph type="body" sz="quarter" idx="10"/>
+          </p:nvPr>
+        </p:nvSpPr>
+        <p:spPr/>
+        <p:txBody>
+          <a:bodyPr/>
+          <a:lstStyle/>
+          <a:p>
+            <a:r>
+              <a:rPr lang="en-US" dirty="0" smtClean="0"/>
+              <a:t>Nordstrom Innovation Lab</a:t>
+            </a:r>
+            <a:endParaRPr lang="en-US" dirty="0"/>
+          </a:p>
+        </p:txBody>
+      </p:sp>
+    </p:spTree>
+    <p:extLst>
+      <p:ext uri="{BB962C8B-B14F-4D97-AF65-F5344CB8AC3E}">
+        <p14:creationId xmlns:p14="http://schemas.microsoft.com/office/powerpoint/2010/main" val="2616261540"/>
+      </p:ext>
+    </p:extLst>
+  </p:cSld>
+  <p:clrMapOvr>
+    <a:masterClrMapping/>
+  </p:clrMapOvr>
+  <p:timing>
+    <p:tnLst>
+      <p:par>
+        <p:cTn id="1" dur="indefinite" restart="never" nodeType="tmRoot"/>
+      </p:par>
+    </p:tnLst>
+  </p:timing>
+</p:sld>
+</file>
+
+<file path=ppt/slides/slide18.xml><?xml version="1.0" encoding="utf-8"?>
+<p:sld xmlns:a="http://schemas.openxmlformats.org/drawingml/2006/main" xmlns:r="http://schemas.openxmlformats.org/officeDocument/2006/relationships" xmlns:p="http://schemas.openxmlformats.org/presentationml/2006/main">
+  <p:cSld>
+    <p:spTree>
+      <p:nvGrpSpPr>
+        <p:cNvPr id="1" name=""/>
+        <p:cNvGrpSpPr/>
+        <p:nvPr/>
+      </p:nvGrpSpPr>
+      <p:grpSpPr>
+        <a:xfrm>
+          <a:off x="0" y="0"/>
+          <a:ext cx="0" cy="0"/>
+          <a:chOff x="0" y="0"/>
+          <a:chExt cx="0" cy="0"/>
+        </a:xfrm>
+      </p:grpSpPr>
+      <p:sp>
+        <p:nvSpPr>
+          <p:cNvPr id="2" name="Picture Placeholder 1"/>
+          <p:cNvSpPr>
+            <a:spLocks noGrp="1"/>
+          </p:cNvSpPr>
+          <p:nvPr>
+            <p:ph type="pic" sz="quarter" idx="11"/>
+          </p:nvPr>
+        </p:nvSpPr>
+        <p:spPr/>
+      </p:sp>
+      <p:sp>
+        <p:nvSpPr>
+          <p:cNvPr id="3" name="Title 2"/>
+          <p:cNvSpPr>
+            <a:spLocks noGrp="1"/>
+          </p:cNvSpPr>
+          <p:nvPr>
+            <p:ph type="title"/>
+          </p:nvPr>
+        </p:nvSpPr>
+        <p:spPr/>
+        <p:txBody>
+          <a:bodyPr/>
+          <a:lstStyle/>
+          <a:p>
+            <a:r>
+              <a:rPr lang="en-US" dirty="0" smtClean="0"/>
+              <a:t>Coopetition</a:t>
+            </a:r>
+            <a:endParaRPr lang="en-US" dirty="0"/>
+          </a:p>
+        </p:txBody>
+      </p:sp>
+      <p:sp>
+        <p:nvSpPr>
+          <p:cNvPr id="4" name="Text Placeholder 3"/>
+          <p:cNvSpPr>
+            <a:spLocks noGrp="1"/>
+          </p:cNvSpPr>
+          <p:nvPr>
+            <p:ph type="body" sz="quarter" idx="10"/>
+          </p:nvPr>
+        </p:nvSpPr>
+        <p:spPr/>
+        <p:txBody>
+          <a:bodyPr/>
+          <a:lstStyle/>
+          <a:p>
+            <a:r>
+              <a:rPr lang="en-US" dirty="0" smtClean="0"/>
+              <a:t>Derek Neighbors</a:t>
+            </a:r>
+            <a:endParaRPr lang="en-US" dirty="0"/>
+          </a:p>
+        </p:txBody>
+      </p:sp>
+    </p:spTree>
+    <p:extLst>
+      <p:ext uri="{BB962C8B-B14F-4D97-AF65-F5344CB8AC3E}">
+        <p14:creationId xmlns:p14="http://schemas.microsoft.com/office/powerpoint/2010/main" val="3424745553"/>
+      </p:ext>
+    </p:extLst>
+  </p:cSld>
+  <p:clrMapOvr>
+    <a:masterClrMapping/>
+  </p:clrMapOvr>
+  <p:timing>
+    <p:tnLst>
+      <p:par>
+        <p:cTn id="1" dur="indefinite" restart="never" nodeType="tmRoot"/>
+      </p:par>
+    </p:tnLst>
+  </p:timing>
+</p:sld>
+</file>
+
+<file path=ppt/slides/slide19.xml><?xml version="1.0" encoding="utf-8"?>
+<p:sld xmlns:a="http://schemas.openxmlformats.org/drawingml/2006/main" xmlns:r="http://schemas.openxmlformats.org/officeDocument/2006/relationships" xmlns:p="http://schemas.openxmlformats.org/presentationml/2006/main">
+  <p:cSld>
+    <p:spTree>
+      <p:nvGrpSpPr>
+        <p:cNvPr id="1" name=""/>
+        <p:cNvGrpSpPr/>
+        <p:nvPr/>
+      </p:nvGrpSpPr>
+      <p:grpSpPr>
+        <a:xfrm>
+          <a:off x="0" y="0"/>
+          <a:ext cx="0" cy="0"/>
+          <a:chOff x="0" y="0"/>
+          <a:chExt cx="0" cy="0"/>
+        </a:xfrm>
+      </p:grpSpPr>
+      <p:sp>
+        <p:nvSpPr>
+          <p:cNvPr id="2" name="Picture Placeholder 1"/>
+          <p:cNvSpPr>
+            <a:spLocks noGrp="1"/>
+          </p:cNvSpPr>
+          <p:nvPr>
+            <p:ph type="pic" sz="quarter" idx="11"/>
+          </p:nvPr>
+        </p:nvSpPr>
+        <p:spPr/>
+      </p:sp>
+      <p:sp>
+        <p:nvSpPr>
+          <p:cNvPr id="3" name="Title 2"/>
+          <p:cNvSpPr>
+            <a:spLocks noGrp="1"/>
+          </p:cNvSpPr>
+          <p:nvPr>
+            <p:ph type="title"/>
+          </p:nvPr>
+        </p:nvSpPr>
+        <p:spPr/>
+        <p:txBody>
+          <a:bodyPr/>
+          <a:lstStyle/>
+          <a:p>
+            <a:r>
+              <a:rPr lang="en-US" dirty="0" smtClean="0"/>
+              <a:t>Mobs</a:t>
+            </a:r>
+            <a:endParaRPr lang="en-US" dirty="0"/>
+          </a:p>
+        </p:txBody>
+      </p:sp>
+      <p:sp>
+        <p:nvSpPr>
+          <p:cNvPr id="4" name="Text Placeholder 3"/>
+          <p:cNvSpPr>
+            <a:spLocks noGrp="1"/>
+          </p:cNvSpPr>
+          <p:nvPr>
+            <p:ph type="body" sz="quarter" idx="10"/>
+          </p:nvPr>
+        </p:nvSpPr>
+        <p:spPr/>
+        <p:txBody>
+          <a:bodyPr/>
+          <a:lstStyle/>
+          <a:p>
+            <a:r>
+              <a:rPr lang="en-US" dirty="0" smtClean="0"/>
+              <a:t>Hunter Technologies</a:t>
+            </a:r>
+            <a:endParaRPr lang="en-US" dirty="0"/>
+          </a:p>
+        </p:txBody>
+      </p:sp>
+    </p:spTree>
+    <p:extLst>
+      <p:ext uri="{BB962C8B-B14F-4D97-AF65-F5344CB8AC3E}">
+        <p14:creationId xmlns:p14="http://schemas.microsoft.com/office/powerpoint/2010/main" val="362106649"/>
+      </p:ext>
+    </p:extLst>
+  </p:cSld>
+  <p:clrMapOvr>
+    <a:masterClrMapping/>
+  </p:clrMapOvr>
+  <p:timing>
+    <p:tnLst>
+      <p:par>
+        <p:cTn id="1" dur="indefinite" restart="never" nodeType="tmRoot"/>
+      </p:par>
+    </p:tnLst>
+  </p:timing>
+</p:sld>
+</file>
+
+<file path=ppt/slides/slide2.xml><?xml version="1.0" encoding="utf-8"?>
+<p:sld xmlns:a="http://schemas.openxmlformats.org/drawingml/2006/main" xmlns:r="http://schemas.openxmlformats.org/officeDocument/2006/relationships" xmlns:p="http://schemas.openxmlformats.org/presentationml/2006/main">
+  <p:cSld>
+    <p:spTree>
+      <p:nvGrpSpPr>
+        <p:cNvPr id="1" name=""/>
+        <p:cNvGrpSpPr/>
+        <p:nvPr/>
+      </p:nvGrpSpPr>
+      <p:grpSpPr>
+        <a:xfrm>
+          <a:off x="0" y="0"/>
+          <a:ext cx="0" cy="0"/>
+          <a:chOff x="0" y="0"/>
+          <a:chExt cx="0" cy="0"/>
+        </a:xfrm>
+      </p:grpSpPr>
+      <p:pic>
+        <p:nvPicPr>
+          <p:cNvPr id="6" name="Content Placeholder 5"/>
+          <p:cNvPicPr>
+            <a:picLocks noGrp="1" noChangeAspect="1"/>
+          </p:cNvPicPr>
+          <p:nvPr>
+            <p:ph idx="4294967295"/>
+          </p:nvPr>
+        </p:nvPicPr>
+        <p:blipFill>
+          <a:blip r:embed="rId2">
+            <a:extLst>
+              <a:ext uri="{28A0092B-C50C-407E-A947-70E740481C1C}">
+                <a14:useLocalDpi xmlns:a14="http://schemas.microsoft.com/office/drawing/2010/main" val="0"/>
+              </a:ext>
+            </a:extLst>
+          </a:blip>
+          <a:stretch>
+            <a:fillRect/>
+          </a:stretch>
+        </p:blipFill>
+        <p:spPr>
+          <a:xfrm>
+            <a:off x="0" y="-1143000"/>
+            <a:ext cx="12192000" cy="9144000"/>
+          </a:xfrm>
+        </p:spPr>
+      </p:pic>
+      <p:sp>
+        <p:nvSpPr>
+          <p:cNvPr id="4" name="Title 3"/>
+          <p:cNvSpPr>
+            <a:spLocks noGrp="1"/>
+          </p:cNvSpPr>
+          <p:nvPr>
+            <p:ph type="title"/>
+          </p:nvPr>
+        </p:nvSpPr>
+        <p:spPr/>
+        <p:txBody>
+          <a:bodyPr/>
+          <a:lstStyle/>
+          <a:p>
+            <a:r>
+              <a:rPr lang="en-US" dirty="0" smtClean="0"/>
+              <a:t>Most people have never seen 2-star success</a:t>
+            </a:r>
+            <a:endParaRPr lang="en-US" dirty="0"/>
+          </a:p>
+        </p:txBody>
+      </p:sp>
+    </p:spTree>
+    <p:extLst>
+      <p:ext uri="{BB962C8B-B14F-4D97-AF65-F5344CB8AC3E}">
+        <p14:creationId xmlns:p14="http://schemas.microsoft.com/office/powerpoint/2010/main" val="3956598183"/>
+      </p:ext>
+    </p:extLst>
+  </p:cSld>
+  <p:clrMapOvr>
+    <a:masterClrMapping/>
+  </p:clrMapOvr>
+  <p:timing>
+    <p:tnLst>
+      <p:par>
+        <p:cTn id="1" dur="indefinite" restart="never" nodeType="tmRoot"/>
+      </p:par>
+    </p:tnLst>
+  </p:timing>
+</p:sld>
+</file>
+
+<file path=ppt/slides/slide20.xml><?xml version="1.0" encoding="utf-8"?>
+<p:sld xmlns:a="http://schemas.openxmlformats.org/drawingml/2006/main" xmlns:r="http://schemas.openxmlformats.org/officeDocument/2006/relationships" xmlns:p="http://schemas.openxmlformats.org/presentationml/2006/main">
+  <p:cSld>
+    <p:spTree>
+      <p:nvGrpSpPr>
+        <p:cNvPr id="1" name=""/>
+        <p:cNvGrpSpPr/>
+        <p:nvPr/>
+      </p:nvGrpSpPr>
+      <p:grpSpPr>
+        <a:xfrm>
+          <a:off x="0" y="0"/>
+          <a:ext cx="0" cy="0"/>
+          <a:chOff x="0" y="0"/>
+          <a:chExt cx="0" cy="0"/>
+        </a:xfrm>
+      </p:grpSpPr>
+      <p:sp>
+        <p:nvSpPr>
+          <p:cNvPr id="2" name="Picture Placeholder 1"/>
+          <p:cNvSpPr>
+            <a:spLocks noGrp="1"/>
+          </p:cNvSpPr>
+          <p:nvPr>
+            <p:ph type="pic" sz="quarter" idx="11"/>
+          </p:nvPr>
+        </p:nvSpPr>
+        <p:spPr/>
+      </p:sp>
+      <p:sp>
+        <p:nvSpPr>
+          <p:cNvPr id="3" name="Title 2"/>
+          <p:cNvSpPr>
+            <a:spLocks noGrp="1"/>
+          </p:cNvSpPr>
+          <p:nvPr>
+            <p:ph type="title"/>
+          </p:nvPr>
+        </p:nvSpPr>
+        <p:spPr/>
+        <p:txBody>
+          <a:bodyPr/>
+          <a:lstStyle/>
+          <a:p>
+            <a:r>
+              <a:rPr lang="en-US" dirty="0" smtClean="0"/>
+              <a:t>Responsive organization</a:t>
+            </a:r>
+            <a:endParaRPr lang="en-US" dirty="0"/>
+          </a:p>
+        </p:txBody>
+      </p:sp>
+      <p:sp>
+        <p:nvSpPr>
+          <p:cNvPr id="4" name="Text Placeholder 3"/>
+          <p:cNvSpPr>
+            <a:spLocks noGrp="1"/>
+          </p:cNvSpPr>
+          <p:nvPr>
+            <p:ph type="body" sz="quarter" idx="10"/>
+          </p:nvPr>
+        </p:nvSpPr>
+        <p:spPr/>
+        <p:txBody>
+          <a:bodyPr/>
+          <a:lstStyle/>
+          <a:p>
+            <a:r>
+              <a:rPr lang="en-US" dirty="0" smtClean="0"/>
+              <a:t>Red Robin</a:t>
+            </a:r>
+            <a:endParaRPr lang="en-US" dirty="0"/>
+          </a:p>
+        </p:txBody>
+      </p:sp>
+    </p:spTree>
+    <p:extLst>
+      <p:ext uri="{BB962C8B-B14F-4D97-AF65-F5344CB8AC3E}">
+        <p14:creationId xmlns:p14="http://schemas.microsoft.com/office/powerpoint/2010/main" val="2398839510"/>
+      </p:ext>
+    </p:extLst>
+  </p:cSld>
+  <p:clrMapOvr>
+    <a:masterClrMapping/>
+  </p:clrMapOvr>
+  <p:timing>
+    <p:tnLst>
+      <p:par>
+        <p:cTn id="1" dur="indefinite" restart="never" nodeType="tmRoot"/>
+      </p:par>
+    </p:tnLst>
+  </p:timing>
+</p:sld>
+</file>
+
+<file path=ppt/slides/slide21.xml><?xml version="1.0" encoding="utf-8"?>
+<p:sld xmlns:a="http://schemas.openxmlformats.org/drawingml/2006/main" xmlns:r="http://schemas.openxmlformats.org/officeDocument/2006/relationships" xmlns:p="http://schemas.openxmlformats.org/presentationml/2006/main">
+  <p:cSld>
+    <p:spTree>
+      <p:nvGrpSpPr>
+        <p:cNvPr id="1" name=""/>
+        <p:cNvGrpSpPr/>
+        <p:nvPr/>
+      </p:nvGrpSpPr>
+      <p:grpSpPr>
+        <a:xfrm>
+          <a:off x="0" y="0"/>
+          <a:ext cx="0" cy="0"/>
+          <a:chOff x="0" y="0"/>
+          <a:chExt cx="0" cy="0"/>
+        </a:xfrm>
+      </p:grpSpPr>
+      <p:sp>
+        <p:nvSpPr>
+          <p:cNvPr id="5" name="Title 4"/>
+          <p:cNvSpPr>
+            <a:spLocks noGrp="1"/>
+          </p:cNvSpPr>
+          <p:nvPr>
+            <p:ph type="title"/>
+          </p:nvPr>
+        </p:nvSpPr>
+        <p:spPr/>
+        <p:txBody>
+          <a:bodyPr/>
+          <a:lstStyle/>
+          <a:p>
+            <a:r>
+              <a:rPr lang="en-US" dirty="0" smtClean="0"/>
+              <a:t>TL;DR</a:t>
+            </a:r>
+            <a:endParaRPr lang="en-US" dirty="0"/>
+          </a:p>
+        </p:txBody>
+      </p:sp>
+      <p:sp>
+        <p:nvSpPr>
+          <p:cNvPr id="6" name="Content Placeholder 5"/>
+          <p:cNvSpPr>
+            <a:spLocks noGrp="1"/>
+          </p:cNvSpPr>
+          <p:nvPr>
+            <p:ph idx="1"/>
+          </p:nvPr>
+        </p:nvSpPr>
+        <p:spPr>
+          <a:xfrm>
+            <a:off x="838200" y="1825625"/>
+            <a:ext cx="10515600" cy="4817222"/>
+          </a:xfrm>
+        </p:spPr>
+        <p:txBody>
+          <a:bodyPr>
+            <a:normAutofit/>
+          </a:bodyPr>
+          <a:lstStyle/>
+          <a:p>
+            <a:r>
+              <a:rPr lang="en-US" dirty="0" smtClean="0"/>
+              <a:t>Awesome discipline is awesome</a:t>
+            </a:r>
+          </a:p>
+          <a:p>
+            <a:r>
+              <a:rPr lang="en-US" dirty="0" smtClean="0"/>
+              <a:t>Very few teams have it</a:t>
+            </a:r>
+          </a:p>
+          <a:p>
+            <a:r>
+              <a:rPr lang="en-US" dirty="0" smtClean="0"/>
+              <a:t>Most teams think they do…until they see someone who actually does</a:t>
+            </a:r>
+            <a:endParaRPr lang="en-US" dirty="0"/>
+          </a:p>
+          <a:p>
+            <a:endParaRPr lang="en-US" dirty="0" smtClean="0"/>
+          </a:p>
+          <a:p>
+            <a:r>
+              <a:rPr lang="en-US" dirty="0" smtClean="0"/>
+              <a:t>But some teams have discipline</a:t>
+            </a:r>
+          </a:p>
+          <a:p>
+            <a:r>
+              <a:rPr lang="en-US" dirty="0" smtClean="0"/>
+              <a:t>And then build on that to make really awesome</a:t>
+            </a:r>
+          </a:p>
+          <a:p>
+            <a:endParaRPr lang="en-US" dirty="0"/>
+          </a:p>
+          <a:p>
+            <a:r>
+              <a:rPr lang="en-US" dirty="0" smtClean="0"/>
+              <a:t>Just make sure you have the discipline to support the awesome</a:t>
+            </a:r>
+            <a:endParaRPr lang="en-US" dirty="0"/>
+          </a:p>
+        </p:txBody>
+      </p:sp>
+    </p:spTree>
+    <p:extLst>
+      <p:ext uri="{BB962C8B-B14F-4D97-AF65-F5344CB8AC3E}">
+        <p14:creationId xmlns:p14="http://schemas.microsoft.com/office/powerpoint/2010/main" val="341780482"/>
+      </p:ext>
+    </p:extLst>
+  </p:cSld>
+  <p:clrMapOvr>
+    <a:masterClrMapping/>
+  </p:clrMapOvr>
+  <p:timing>
+    <p:tnLst>
+      <p:par>
+        <p:cTn id="1" dur="indefinite" restart="never" nodeType="tmRoot">
+          <p:childTnLst>
+            <p:seq concurrent="1" nextAc="seek">
+              <p:cTn id="2" dur="indefinite" nodeType="mainSeq">
+                <p:childTnLst>
+                  <p:par>
+                    <p:cTn id="3" fill="hold">
+                      <p:stCondLst>
+                        <p:cond delay="indefinite"/>
+                      </p:stCondLst>
+                      <p:childTnLst>
+                        <p:par>
+                          <p:cTn id="4" fill="hold">
+                            <p:stCondLst>
+                              <p:cond delay="0"/>
+                            </p:stCondLst>
+                            <p:childTnLst>
+                              <p:par>
+                                <p:cTn id="5" presetID="1" presetClass="entr" presetSubtype="0" fill="hold" nodeType="clickEffect">
+                                  <p:stCondLst>
+                                    <p:cond delay="0"/>
+                                  </p:stCondLst>
+                                  <p:childTnLst>
+                                    <p:set>
+                                      <p:cBhvr>
+                                        <p:cTn id="6" dur="1" fill="hold">
+                                          <p:stCondLst>
+                                            <p:cond delay="0"/>
+                                          </p:stCondLst>
+                                        </p:cTn>
+                                        <p:tgtEl>
+                                          <p:spTgt spid="6">
+                                            <p:txEl>
+                                              <p:pRg st="0" end="0"/>
+                                            </p:txEl>
+                                          </p:spTgt>
+                                        </p:tgtEl>
+                                        <p:attrNameLst>
+                                          <p:attrName>style.visibility</p:attrName>
+                                        </p:attrNameLst>
+                                      </p:cBhvr>
+                                      <p:to>
+                                        <p:strVal val="visible"/>
+                                      </p:to>
+                                    </p:set>
+                                  </p:childTnLst>
+                                </p:cTn>
+                              </p:par>
+                              <p:par>
+                                <p:cTn id="7" presetID="1" presetClass="entr" presetSubtype="0" fill="hold" nodeType="withEffect">
+                                  <p:stCondLst>
+                                    <p:cond delay="0"/>
+                                  </p:stCondLst>
+                                  <p:childTnLst>
+                                    <p:set>
+                                      <p:cBhvr>
+                                        <p:cTn id="8" dur="1" fill="hold">
+                                          <p:stCondLst>
+                                            <p:cond delay="0"/>
+                                          </p:stCondLst>
+                                        </p:cTn>
+                                        <p:tgtEl>
+                                          <p:spTgt spid="6">
+                                            <p:txEl>
+                                              <p:pRg st="1" end="1"/>
+                                            </p:txEl>
+                                          </p:spTgt>
+                                        </p:tgtEl>
+                                        <p:attrNameLst>
+                                          <p:attrName>style.visibility</p:attrName>
+                                        </p:attrNameLst>
+                                      </p:cBhvr>
+                                      <p:to>
+                                        <p:strVal val="visible"/>
+                                      </p:to>
+                                    </p:set>
+                                  </p:childTnLst>
+                                </p:cTn>
+                              </p:par>
+                              <p:par>
+                                <p:cTn id="9" presetID="1" presetClass="entr" presetSubtype="0" fill="hold" nodeType="withEffect">
+                                  <p:stCondLst>
+                                    <p:cond delay="0"/>
+                                  </p:stCondLst>
+                                  <p:childTnLst>
+                                    <p:set>
+                                      <p:cBhvr>
+                                        <p:cTn id="10" dur="1" fill="hold">
+                                          <p:stCondLst>
+                                            <p:cond delay="0"/>
+                                          </p:stCondLst>
+                                        </p:cTn>
+                                        <p:tgtEl>
+                                          <p:spTgt spid="6">
+                                            <p:txEl>
+                                              <p:pRg st="2" end="2"/>
+                                            </p:txEl>
+                                          </p:spTgt>
+                                        </p:tgtEl>
+                                        <p:attrNameLst>
+                                          <p:attrName>style.visibility</p:attrName>
+                                        </p:attrNameLst>
+                                      </p:cBhvr>
+                                      <p:to>
+                                        <p:strVal val="visible"/>
+                                      </p:to>
+                                    </p:set>
+                                  </p:childTnLst>
+                                </p:cTn>
+                              </p:par>
+                            </p:childTnLst>
+                          </p:cTn>
+                        </p:par>
+                      </p:childTnLst>
+                    </p:cTn>
+                  </p:par>
+                  <p:par>
+                    <p:cTn id="11" fill="hold">
+                      <p:stCondLst>
+                        <p:cond delay="indefinite"/>
+                      </p:stCondLst>
+                      <p:childTnLst>
+                        <p:par>
+                          <p:cTn id="12" fill="hold">
+                            <p:stCondLst>
+                              <p:cond delay="0"/>
+                            </p:stCondLst>
+                            <p:childTnLst>
+                              <p:par>
+                                <p:cTn id="13" presetID="1" presetClass="entr" presetSubtype="0" fill="hold" nodeType="clickEffect">
+                                  <p:stCondLst>
+                                    <p:cond delay="0"/>
+                                  </p:stCondLst>
+                                  <p:childTnLst>
+                                    <p:set>
+                                      <p:cBhvr>
+                                        <p:cTn id="14" dur="1" fill="hold">
+                                          <p:stCondLst>
+                                            <p:cond delay="0"/>
+                                          </p:stCondLst>
+                                        </p:cTn>
+                                        <p:tgtEl>
+                                          <p:spTgt spid="6">
+                                            <p:txEl>
+                                              <p:pRg st="4" end="4"/>
+                                            </p:txEl>
+                                          </p:spTgt>
+                                        </p:tgtEl>
+                                        <p:attrNameLst>
+                                          <p:attrName>style.visibility</p:attrName>
+                                        </p:attrNameLst>
+                                      </p:cBhvr>
+                                      <p:to>
+                                        <p:strVal val="visible"/>
+                                      </p:to>
+                                    </p:set>
+                                  </p:childTnLst>
+                                </p:cTn>
+                              </p:par>
+                              <p:par>
+                                <p:cTn id="15" presetID="1" presetClass="entr" presetSubtype="0" fill="hold" nodeType="withEffect">
+                                  <p:stCondLst>
+                                    <p:cond delay="0"/>
+                                  </p:stCondLst>
+                                  <p:childTnLst>
+                                    <p:set>
+                                      <p:cBhvr>
+                                        <p:cTn id="16" dur="1" fill="hold">
+                                          <p:stCondLst>
+                                            <p:cond delay="0"/>
+                                          </p:stCondLst>
+                                        </p:cTn>
+                                        <p:tgtEl>
+                                          <p:spTgt spid="6">
+                                            <p:txEl>
+                                              <p:pRg st="5" end="5"/>
+                                            </p:txEl>
+                                          </p:spTgt>
+                                        </p:tgtEl>
+                                        <p:attrNameLst>
+                                          <p:attrName>style.visibility</p:attrName>
+                                        </p:attrNameLst>
+                                      </p:cBhvr>
+                                      <p:to>
+                                        <p:strVal val="visible"/>
+                                      </p:to>
+                                    </p:set>
+                                  </p:childTnLst>
+                                </p:cTn>
+                              </p:par>
+                            </p:childTnLst>
+                          </p:cTn>
+                        </p:par>
+                      </p:childTnLst>
+                    </p:cTn>
+                  </p:par>
+                  <p:par>
+                    <p:cTn id="17" fill="hold">
+                      <p:stCondLst>
+                        <p:cond delay="indefinite"/>
+                      </p:stCondLst>
+                      <p:childTnLst>
+                        <p:par>
+                          <p:cTn id="18" fill="hold">
+                            <p:stCondLst>
+                              <p:cond delay="0"/>
+                            </p:stCondLst>
+                            <p:childTnLst>
+                              <p:par>
+                                <p:cTn id="19" presetID="1" presetClass="entr" presetSubtype="0" fill="hold" nodeType="clickEffect">
+                                  <p:stCondLst>
+                                    <p:cond delay="0"/>
+                                  </p:stCondLst>
+                                  <p:childTnLst>
+                                    <p:set>
+                                      <p:cBhvr>
+                                        <p:cTn id="20" dur="1" fill="hold">
+                                          <p:stCondLst>
+                                            <p:cond delay="0"/>
+                                          </p:stCondLst>
+                                        </p:cTn>
+                                        <p:tgtEl>
+                                          <p:spTgt spid="6">
+                                            <p:txEl>
+                                              <p:pRg st="7" end="7"/>
+                                            </p:txEl>
+                                          </p:spTgt>
+                                        </p:tgtEl>
+                                        <p:attrNameLst>
+                                          <p:attrName>style.visibility</p:attrName>
+                                        </p:attrNameLst>
+                                      </p:cBhvr>
+                                      <p:to>
+                                        <p:strVal val="visible"/>
+                                      </p:to>
+                                    </p:set>
+                                  </p:childTnLst>
+                                </p:cTn>
+                              </p:par>
+                            </p:childTnLst>
+                          </p:cTn>
+                        </p:par>
+                      </p:childTnLst>
+                    </p:cTn>
+                  </p:par>
+                </p:childTnLst>
+              </p:cTn>
+              <p:prevCondLst>
+                <p:cond evt="onPrev" delay="0">
+                  <p:tgtEl>
+                    <p:sldTgt/>
+                  </p:tgtEl>
+                </p:cond>
+              </p:prevCondLst>
+              <p:nextCondLst>
+                <p:cond evt="onNext" delay="0">
+                  <p:tgtEl>
+                    <p:sldTgt/>
+                  </p:tgtEl>
+                </p:cond>
+              </p:nextCondLst>
+            </p:seq>
+          </p:childTnLst>
+        </p:cTn>
+      </p:par>
+    </p:tnLst>
+  </p:timing>
+</p:sld>
+</file>
+
+<file path=ppt/slides/slide22.xml><?xml version="1.0" encoding="utf-8"?>
+<p:sld xmlns:a="http://schemas.openxmlformats.org/drawingml/2006/main" xmlns:r="http://schemas.openxmlformats.org/officeDocument/2006/relationships" xmlns:p="http://schemas.openxmlformats.org/presentationml/2006/main">
+  <p:cSld>
+    <p:spTree>
+      <p:nvGrpSpPr>
+        <p:cNvPr id="1" name=""/>
+        <p:cNvGrpSpPr/>
+        <p:nvPr/>
+      </p:nvGrpSpPr>
+      <p:grpSpPr>
+        <a:xfrm>
+          <a:off x="0" y="0"/>
+          <a:ext cx="0" cy="0"/>
+          <a:chOff x="0" y="0"/>
+          <a:chExt cx="0" cy="0"/>
+        </a:xfrm>
+      </p:grpSpPr>
+      <p:sp>
+        <p:nvSpPr>
+          <p:cNvPr id="2" name="Title 1"/>
+          <p:cNvSpPr>
+            <a:spLocks noGrp="1"/>
+          </p:cNvSpPr>
+          <p:nvPr>
+            <p:ph type="ctrTitle"/>
+          </p:nvPr>
+        </p:nvSpPr>
+        <p:spPr/>
+        <p:txBody>
+          <a:bodyPr>
+            <a:normAutofit fontScale="90000"/>
+          </a:bodyPr>
+          <a:lstStyle/>
+          <a:p>
+            <a:r>
+              <a:rPr lang="en-US" dirty="0" smtClean="0"/>
+              <a:t>Agility:</a:t>
+            </a:r>
+            <a:br>
+              <a:rPr lang="en-US" dirty="0" smtClean="0"/>
+            </a:br>
+            <a:r>
+              <a:rPr lang="en-US" dirty="0" smtClean="0"/>
+              <a:t>Step 1: Discipline</a:t>
+            </a:r>
+            <a:br>
+              <a:rPr lang="en-US" dirty="0" smtClean="0"/>
+            </a:br>
+            <a:r>
+              <a:rPr lang="en-US" dirty="0" smtClean="0"/>
+              <a:t>Step 2: Make awesome</a:t>
+            </a:r>
+            <a:endParaRPr lang="en-US" dirty="0"/>
+          </a:p>
+        </p:txBody>
+      </p:sp>
+      <p:sp>
+        <p:nvSpPr>
+          <p:cNvPr id="3" name="Subtitle 2"/>
+          <p:cNvSpPr>
+            <a:spLocks noGrp="1"/>
+          </p:cNvSpPr>
+          <p:nvPr>
+            <p:ph type="subTitle" idx="1"/>
+          </p:nvPr>
+        </p:nvSpPr>
+        <p:spPr>
+          <a:xfrm>
+            <a:off x="1524000" y="4113027"/>
+            <a:ext cx="9144000" cy="1655762"/>
+          </a:xfrm>
+        </p:spPr>
+        <p:txBody>
+          <a:bodyPr/>
+          <a:lstStyle/>
+          <a:p>
+            <a:r>
+              <a:rPr lang="en-US" dirty="0" smtClean="0"/>
+              <a:t>Arlo Belshee</a:t>
+            </a:r>
+          </a:p>
+          <a:p>
+            <a:endParaRPr lang="en-US" dirty="0"/>
+          </a:p>
+          <a:p>
+            <a:r>
+              <a:rPr lang="en-US" dirty="0" smtClean="0"/>
+              <a:t>@</a:t>
+            </a:r>
+            <a:r>
+              <a:rPr lang="en-US" dirty="0" err="1" smtClean="0"/>
+              <a:t>arlobelshee</a:t>
+            </a:r>
+            <a:r>
+              <a:rPr lang="en-US" dirty="0" smtClean="0"/>
+              <a:t>, http://arlobelshee.com/</a:t>
+            </a:r>
+            <a:endParaRPr lang="en-US" dirty="0"/>
+          </a:p>
+        </p:txBody>
+      </p:sp>
+    </p:spTree>
+    <p:extLst>
+      <p:ext uri="{BB962C8B-B14F-4D97-AF65-F5344CB8AC3E}">
+        <p14:creationId xmlns:p14="http://schemas.microsoft.com/office/powerpoint/2010/main" val="2580905299"/>
+      </p:ext>
+    </p:extLst>
+  </p:cSld>
+  <p:clrMapOvr>
+    <a:masterClrMapping/>
+  </p:clrMapOvr>
+  <p:timing>
+    <p:tnLst>
+      <p:par>
+        <p:cTn id="1" dur="indefinite" restart="never" nodeType="tmRoot"/>
+      </p:par>
+    </p:tnLst>
+  </p:timing>
+</p:sld>
+</file>
+
+<file path=ppt/slides/slide3.xml><?xml version="1.0" encoding="utf-8"?>
+<p:sld xmlns:a="http://schemas.openxmlformats.org/drawingml/2006/main" xmlns:r="http://schemas.openxmlformats.org/officeDocument/2006/relationships" xmlns:p="http://schemas.openxmlformats.org/presentationml/2006/main">
+  <p:cSld>
+    <p:spTree>
+      <p:nvGrpSpPr>
+        <p:cNvPr id="1" name=""/>
+        <p:cNvGrpSpPr/>
+        <p:nvPr/>
+      </p:nvGrpSpPr>
+      <p:grpSpPr>
+        <a:xfrm>
+          <a:off x="0" y="0"/>
+          <a:ext cx="0" cy="0"/>
+          <a:chOff x="0" y="0"/>
+          <a:chExt cx="0" cy="0"/>
+        </a:xfrm>
+      </p:grpSpPr>
+      <p:pic>
+        <p:nvPicPr>
+          <p:cNvPr id="5" name="Picture Placeholder 4"/>
+          <p:cNvPicPr>
+            <a:picLocks noGrp="1" noChangeAspect="1"/>
+          </p:cNvPicPr>
+          <p:nvPr>
+            <p:ph type="pic" sz="quarter" idx="11"/>
+          </p:nvPr>
+        </p:nvPicPr>
+        <p:blipFill>
+          <a:blip r:embed="rId2">
+            <a:extLst>
+              <a:ext uri="{28A0092B-C50C-407E-A947-70E740481C1C}">
+                <a14:useLocalDpi xmlns:a14="http://schemas.microsoft.com/office/drawing/2010/main" val="0"/>
+              </a:ext>
+            </a:extLst>
+          </a:blip>
+          <a:srcRect l="9941" r="9941"/>
+          <a:stretch>
+            <a:fillRect/>
+          </a:stretch>
+        </p:blipFill>
+        <p:spPr/>
+      </p:pic>
+      <p:sp>
+        <p:nvSpPr>
+          <p:cNvPr id="3" name="Title 2"/>
+          <p:cNvSpPr>
+            <a:spLocks noGrp="1"/>
+          </p:cNvSpPr>
+          <p:nvPr>
+            <p:ph type="title"/>
+          </p:nvPr>
+        </p:nvSpPr>
+        <p:spPr/>
+        <p:txBody>
+          <a:bodyPr/>
+          <a:lstStyle/>
+          <a:p>
+            <a:r>
+              <a:rPr lang="en-US" dirty="0" smtClean="0"/>
+              <a:t>Zero bugs: </a:t>
+            </a:r>
+            <a:r>
+              <a:rPr lang="en-US" b="1" dirty="0" smtClean="0"/>
+              <a:t>WRITE</a:t>
+            </a:r>
+            <a:r>
+              <a:rPr lang="en-US" dirty="0" smtClean="0"/>
+              <a:t> &lt; 1 bug per fortnight per team</a:t>
+            </a:r>
+            <a:endParaRPr lang="en-US" b="1" dirty="0"/>
+          </a:p>
+        </p:txBody>
+      </p:sp>
+      <p:sp>
+        <p:nvSpPr>
+          <p:cNvPr id="4" name="Text Placeholder 3"/>
+          <p:cNvSpPr>
+            <a:spLocks noGrp="1"/>
+          </p:cNvSpPr>
+          <p:nvPr>
+            <p:ph type="body" sz="quarter" idx="10"/>
+          </p:nvPr>
+        </p:nvSpPr>
+        <p:spPr/>
+        <p:txBody>
+          <a:bodyPr/>
+          <a:lstStyle/>
+          <a:p>
+            <a:r>
+              <a:rPr lang="en-US" dirty="0" smtClean="0"/>
+              <a:t>Microsoft Online Store</a:t>
+            </a:r>
+            <a:endParaRPr lang="en-US" dirty="0"/>
+          </a:p>
+        </p:txBody>
+      </p:sp>
+    </p:spTree>
+    <p:extLst>
+      <p:ext uri="{BB962C8B-B14F-4D97-AF65-F5344CB8AC3E}">
+        <p14:creationId xmlns:p14="http://schemas.microsoft.com/office/powerpoint/2010/main" val="3642598487"/>
+      </p:ext>
+    </p:extLst>
+  </p:cSld>
+  <p:clrMapOvr>
+    <a:masterClrMapping/>
+  </p:clrMapOvr>
+  <p:timing>
+    <p:tnLst>
+      <p:par>
+        <p:cTn id="1" dur="indefinite" restart="never" nodeType="tmRoot"/>
+      </p:par>
+    </p:tnLst>
+  </p:timing>
+</p:sld>
+</file>
+
+<file path=ppt/slides/slide4.xml><?xml version="1.0" encoding="utf-8"?>
+<p:sld xmlns:a="http://schemas.openxmlformats.org/drawingml/2006/main" xmlns:r="http://schemas.openxmlformats.org/officeDocument/2006/relationships" xmlns:p="http://schemas.openxmlformats.org/presentationml/2006/main">
+  <p:cSld>
+    <p:spTree>
+      <p:nvGrpSpPr>
+        <p:cNvPr id="1" name=""/>
+        <p:cNvGrpSpPr/>
+        <p:nvPr/>
+      </p:nvGrpSpPr>
+      <p:grpSpPr>
+        <a:xfrm>
+          <a:off x="0" y="0"/>
+          <a:ext cx="0" cy="0"/>
+          <a:chOff x="0" y="0"/>
+          <a:chExt cx="0" cy="0"/>
+        </a:xfrm>
+      </p:grpSpPr>
+      <p:pic>
+        <p:nvPicPr>
+          <p:cNvPr id="5" name="Picture Placeholder 4"/>
+          <p:cNvPicPr>
+            <a:picLocks noGrp="1" noChangeAspect="1"/>
+          </p:cNvPicPr>
+          <p:nvPr>
+            <p:ph type="pic" sz="quarter" idx="11"/>
+          </p:nvPr>
+        </p:nvPicPr>
+        <p:blipFill>
+          <a:blip r:embed="rId2">
+            <a:extLst>
+              <a:ext uri="{28A0092B-C50C-407E-A947-70E740481C1C}">
+                <a14:useLocalDpi xmlns:a14="http://schemas.microsoft.com/office/drawing/2010/main" val="0"/>
+              </a:ext>
+            </a:extLst>
+          </a:blip>
+          <a:srcRect t="20496" b="20496"/>
+          <a:stretch>
+            <a:fillRect/>
+          </a:stretch>
+        </p:blipFill>
+        <p:spPr/>
+      </p:pic>
+      <p:sp>
+        <p:nvSpPr>
+          <p:cNvPr id="3" name="Title 2"/>
+          <p:cNvSpPr>
+            <a:spLocks noGrp="1"/>
+          </p:cNvSpPr>
+          <p:nvPr>
+            <p:ph type="title"/>
+          </p:nvPr>
+        </p:nvSpPr>
+        <p:spPr/>
+        <p:txBody>
+          <a:bodyPr/>
+          <a:lstStyle/>
+          <a:p>
+            <a:r>
+              <a:rPr lang="en-US" dirty="0" smtClean="0"/>
+              <a:t>Zero bugs: Bug DB median size 0; max size 1</a:t>
+            </a:r>
+            <a:endParaRPr lang="en-US" dirty="0"/>
+          </a:p>
+        </p:txBody>
+      </p:sp>
+      <p:sp>
+        <p:nvSpPr>
+          <p:cNvPr id="4" name="Text Placeholder 3"/>
+          <p:cNvSpPr>
+            <a:spLocks noGrp="1"/>
+          </p:cNvSpPr>
+          <p:nvPr>
+            <p:ph type="body" sz="quarter" idx="10"/>
+          </p:nvPr>
+        </p:nvSpPr>
+        <p:spPr/>
+        <p:txBody>
+          <a:bodyPr/>
+          <a:lstStyle/>
+          <a:p>
+            <a:r>
+              <a:rPr lang="en-US" dirty="0" smtClean="0"/>
+              <a:t>Smile Box</a:t>
+            </a:r>
+            <a:endParaRPr lang="en-US" dirty="0"/>
+          </a:p>
+        </p:txBody>
+      </p:sp>
+    </p:spTree>
+    <p:extLst>
+      <p:ext uri="{BB962C8B-B14F-4D97-AF65-F5344CB8AC3E}">
+        <p14:creationId xmlns:p14="http://schemas.microsoft.com/office/powerpoint/2010/main" val="1256752871"/>
+      </p:ext>
+    </p:extLst>
+  </p:cSld>
+  <p:clrMapOvr>
+    <a:masterClrMapping/>
+  </p:clrMapOvr>
+  <p:timing>
+    <p:tnLst>
+      <p:par>
+        <p:cTn id="1" dur="indefinite" restart="never" nodeType="tmRoot"/>
+      </p:par>
+    </p:tnLst>
+  </p:timing>
+</p:sld>
+</file>
+
+<file path=ppt/slides/slide5.xml><?xml version="1.0" encoding="utf-8"?>
+<p:sld xmlns:a="http://schemas.openxmlformats.org/drawingml/2006/main" xmlns:r="http://schemas.openxmlformats.org/officeDocument/2006/relationships" xmlns:p="http://schemas.openxmlformats.org/presentationml/2006/main">
+  <p:cSld>
+    <p:spTree>
+      <p:nvGrpSpPr>
+        <p:cNvPr id="1" name=""/>
+        <p:cNvGrpSpPr/>
+        <p:nvPr/>
+      </p:nvGrpSpPr>
+      <p:grpSpPr>
+        <a:xfrm>
+          <a:off x="0" y="0"/>
+          <a:ext cx="0" cy="0"/>
+          <a:chOff x="0" y="0"/>
+          <a:chExt cx="0" cy="0"/>
+        </a:xfrm>
+      </p:grpSpPr>
+      <p:pic>
+        <p:nvPicPr>
+          <p:cNvPr id="5" name="Picture Placeholder 4"/>
+          <p:cNvPicPr>
+            <a:picLocks noGrp="1" noChangeAspect="1"/>
+          </p:cNvPicPr>
+          <p:nvPr>
+            <p:ph type="pic" sz="quarter" idx="11"/>
+          </p:nvPr>
+        </p:nvPicPr>
+        <p:blipFill>
+          <a:blip r:embed="rId2">
+            <a:extLst>
+              <a:ext uri="{28A0092B-C50C-407E-A947-70E740481C1C}">
+                <a14:useLocalDpi xmlns:a14="http://schemas.microsoft.com/office/drawing/2010/main" val="0"/>
+              </a:ext>
+            </a:extLst>
+          </a:blip>
+          <a:srcRect t="1129" b="1129"/>
+          <a:stretch>
+            <a:fillRect/>
+          </a:stretch>
+        </p:blipFill>
+        <p:spPr/>
+      </p:pic>
+      <p:sp>
+        <p:nvSpPr>
+          <p:cNvPr id="3" name="Title 2"/>
+          <p:cNvSpPr>
+            <a:spLocks noGrp="1"/>
+          </p:cNvSpPr>
+          <p:nvPr>
+            <p:ph type="title"/>
+          </p:nvPr>
+        </p:nvSpPr>
+        <p:spPr/>
+        <p:txBody>
+          <a:bodyPr/>
+          <a:lstStyle/>
+          <a:p>
+            <a:r>
+              <a:rPr lang="en-US" dirty="0" smtClean="0"/>
+              <a:t>Finish 95% of tasks within +/- 5% of prediction</a:t>
+            </a:r>
+            <a:endParaRPr lang="en-US" dirty="0"/>
+          </a:p>
+        </p:txBody>
+      </p:sp>
+      <p:sp>
+        <p:nvSpPr>
+          <p:cNvPr id="4" name="Text Placeholder 3"/>
+          <p:cNvSpPr>
+            <a:spLocks noGrp="1"/>
+          </p:cNvSpPr>
+          <p:nvPr>
+            <p:ph type="body" sz="quarter" idx="10"/>
+          </p:nvPr>
+        </p:nvSpPr>
+        <p:spPr/>
+        <p:txBody>
+          <a:bodyPr/>
+          <a:lstStyle/>
+          <a:p>
+            <a:r>
+              <a:rPr lang="en-US" dirty="0" smtClean="0"/>
+              <a:t>Silver Platter</a:t>
+            </a:r>
+            <a:endParaRPr lang="en-US" dirty="0"/>
+          </a:p>
+        </p:txBody>
+      </p:sp>
+    </p:spTree>
+    <p:extLst>
+      <p:ext uri="{BB962C8B-B14F-4D97-AF65-F5344CB8AC3E}">
+        <p14:creationId xmlns:p14="http://schemas.microsoft.com/office/powerpoint/2010/main" val="3438074852"/>
+      </p:ext>
+    </p:extLst>
+  </p:cSld>
+  <p:clrMapOvr>
+    <a:masterClrMapping/>
+  </p:clrMapOvr>
+  <p:timing>
+    <p:tnLst>
+      <p:par>
+        <p:cTn id="1" dur="indefinite" restart="never" nodeType="tmRoot"/>
+      </p:par>
+    </p:tnLst>
+  </p:timing>
+</p:sld>
+</file>
+
+<file path=ppt/slides/slide6.xml><?xml version="1.0" encoding="utf-8"?>
+<p:sld xmlns:a="http://schemas.openxmlformats.org/drawingml/2006/main" xmlns:r="http://schemas.openxmlformats.org/officeDocument/2006/relationships" xmlns:p="http://schemas.openxmlformats.org/presentationml/2006/main">
+  <p:cSld>
+    <p:spTree>
+      <p:nvGrpSpPr>
+        <p:cNvPr id="1" name=""/>
+        <p:cNvGrpSpPr/>
+        <p:nvPr/>
+      </p:nvGrpSpPr>
+      <p:grpSpPr>
+        <a:xfrm>
+          <a:off x="0" y="0"/>
+          <a:ext cx="0" cy="0"/>
+          <a:chOff x="0" y="0"/>
+          <a:chExt cx="0" cy="0"/>
+        </a:xfrm>
+      </p:grpSpPr>
+      <p:pic>
+        <p:nvPicPr>
+          <p:cNvPr id="5" name="Picture Placeholder 4"/>
+          <p:cNvPicPr>
+            <a:picLocks noGrp="1" noChangeAspect="1"/>
+          </p:cNvPicPr>
+          <p:nvPr>
+            <p:ph type="pic" sz="quarter" idx="11"/>
+          </p:nvPr>
+        </p:nvPicPr>
+        <p:blipFill>
+          <a:blip r:embed="rId2">
+            <a:extLst>
+              <a:ext uri="{28A0092B-C50C-407E-A947-70E740481C1C}">
+                <a14:useLocalDpi xmlns:a14="http://schemas.microsoft.com/office/drawing/2010/main" val="0"/>
+              </a:ext>
+            </a:extLst>
+          </a:blip>
+          <a:stretch>
+            <a:fillRect/>
+          </a:stretch>
+        </p:blipFill>
+        <p:spPr>
+          <a:xfrm>
+            <a:off x="2212730" y="-1"/>
+            <a:ext cx="7766540" cy="6858001"/>
+          </a:xfrm>
+          <a:prstGeom prst="rect">
+            <a:avLst/>
+          </a:prstGeom>
+          <a:noFill/>
+          <a:ln>
+            <a:noFill/>
+          </a:ln>
+        </p:spPr>
+      </p:pic>
+      <p:sp>
+        <p:nvSpPr>
+          <p:cNvPr id="3" name="Title 2"/>
+          <p:cNvSpPr>
+            <a:spLocks noGrp="1"/>
+          </p:cNvSpPr>
+          <p:nvPr>
+            <p:ph type="title"/>
+          </p:nvPr>
+        </p:nvSpPr>
+        <p:spPr/>
+        <p:txBody>
+          <a:bodyPr/>
+          <a:lstStyle/>
+          <a:p>
+            <a:r>
+              <a:rPr lang="en-US" dirty="0" smtClean="0"/>
+              <a:t>Prioritize based on value alone</a:t>
+            </a:r>
+            <a:endParaRPr lang="en-US" dirty="0"/>
+          </a:p>
+        </p:txBody>
+      </p:sp>
+      <p:sp>
+        <p:nvSpPr>
+          <p:cNvPr id="4" name="Text Placeholder 3"/>
+          <p:cNvSpPr>
+            <a:spLocks noGrp="1"/>
+          </p:cNvSpPr>
+          <p:nvPr>
+            <p:ph type="body" sz="quarter" idx="10"/>
+          </p:nvPr>
+        </p:nvSpPr>
+        <p:spPr/>
+        <p:txBody>
+          <a:bodyPr/>
+          <a:lstStyle/>
+          <a:p>
+            <a:r>
+              <a:rPr lang="en-US" dirty="0" smtClean="0"/>
+              <a:t>Corey Haines</a:t>
+            </a:r>
+            <a:endParaRPr lang="en-US" dirty="0"/>
+          </a:p>
+        </p:txBody>
+      </p:sp>
+    </p:spTree>
+    <p:extLst>
+      <p:ext uri="{BB962C8B-B14F-4D97-AF65-F5344CB8AC3E}">
+        <p14:creationId xmlns:p14="http://schemas.microsoft.com/office/powerpoint/2010/main" val="3262966372"/>
+      </p:ext>
+    </p:extLst>
+  </p:cSld>
+  <p:clrMapOvr>
+    <a:masterClrMapping/>
+  </p:clrMapOvr>
+  <p:timing>
+    <p:tnLst>
+      <p:par>
+        <p:cTn id="1" dur="indefinite" restart="never" nodeType="tmRoot"/>
+      </p:par>
+    </p:tnLst>
+  </p:timing>
+</p:sld>
+</file>
+
+<file path=ppt/slides/slide7.xml><?xml version="1.0" encoding="utf-8"?>
+<p:sld xmlns:a="http://schemas.openxmlformats.org/drawingml/2006/main" xmlns:r="http://schemas.openxmlformats.org/officeDocument/2006/relationships" xmlns:p="http://schemas.openxmlformats.org/presentationml/2006/main">
+  <p:cSld>
+    <p:spTree>
+      <p:nvGrpSpPr>
+        <p:cNvPr id="1" name=""/>
+        <p:cNvGrpSpPr/>
+        <p:nvPr/>
+      </p:nvGrpSpPr>
+      <p:grpSpPr>
+        <a:xfrm>
+          <a:off x="0" y="0"/>
+          <a:ext cx="0" cy="0"/>
+          <a:chOff x="0" y="0"/>
+          <a:chExt cx="0" cy="0"/>
+        </a:xfrm>
+      </p:grpSpPr>
+      <p:pic>
+        <p:nvPicPr>
+          <p:cNvPr id="5" name="Picture Placeholder 4"/>
+          <p:cNvPicPr>
+            <a:picLocks noGrp="1" noChangeAspect="1"/>
+          </p:cNvPicPr>
+          <p:nvPr>
+            <p:ph type="pic" sz="quarter" idx="11"/>
+          </p:nvPr>
+        </p:nvPicPr>
+        <p:blipFill>
+          <a:blip r:embed="rId2">
+            <a:extLst>
+              <a:ext uri="{28A0092B-C50C-407E-A947-70E740481C1C}">
+                <a14:useLocalDpi xmlns:a14="http://schemas.microsoft.com/office/drawing/2010/main" val="0"/>
+              </a:ext>
+            </a:extLst>
+          </a:blip>
+          <a:stretch>
+            <a:fillRect/>
+          </a:stretch>
+        </p:blipFill>
+        <p:spPr>
+          <a:xfrm>
+            <a:off x="2100941" y="439271"/>
+            <a:ext cx="7990118" cy="6418729"/>
+          </a:xfrm>
+          <a:prstGeom prst="rect">
+            <a:avLst/>
+          </a:prstGeom>
+          <a:noFill/>
+          <a:ln>
+            <a:noFill/>
+          </a:ln>
+        </p:spPr>
+      </p:pic>
+      <p:sp>
+        <p:nvSpPr>
+          <p:cNvPr id="3" name="Title 2"/>
+          <p:cNvSpPr>
+            <a:spLocks noGrp="1"/>
+          </p:cNvSpPr>
+          <p:nvPr>
+            <p:ph type="title"/>
+          </p:nvPr>
+        </p:nvSpPr>
+        <p:spPr/>
+        <p:txBody>
+          <a:bodyPr/>
+          <a:lstStyle/>
+          <a:p>
+            <a:r>
+              <a:rPr lang="en-US" dirty="0" smtClean="0"/>
+              <a:t>Every work item can be done by anyone</a:t>
+            </a:r>
+            <a:endParaRPr lang="en-US" dirty="0"/>
+          </a:p>
+        </p:txBody>
+      </p:sp>
+      <p:sp>
+        <p:nvSpPr>
+          <p:cNvPr id="4" name="Text Placeholder 3"/>
+          <p:cNvSpPr>
+            <a:spLocks noGrp="1"/>
+          </p:cNvSpPr>
+          <p:nvPr>
+            <p:ph type="body" sz="quarter" idx="10"/>
+          </p:nvPr>
+        </p:nvSpPr>
+        <p:spPr/>
+        <p:txBody>
+          <a:bodyPr/>
+          <a:lstStyle/>
+          <a:p>
+            <a:r>
+              <a:rPr lang="en-US" dirty="0" smtClean="0"/>
+              <a:t>Menlo Innovation</a:t>
+            </a:r>
+            <a:endParaRPr lang="en-US" dirty="0"/>
+          </a:p>
+        </p:txBody>
+      </p:sp>
+    </p:spTree>
+    <p:extLst>
+      <p:ext uri="{BB962C8B-B14F-4D97-AF65-F5344CB8AC3E}">
+        <p14:creationId xmlns:p14="http://schemas.microsoft.com/office/powerpoint/2010/main" val="3430037186"/>
+      </p:ext>
+    </p:extLst>
+  </p:cSld>
+  <p:clrMapOvr>
+    <a:masterClrMapping/>
+  </p:clrMapOvr>
+  <p:timing>
+    <p:tnLst>
+      <p:par>
+        <p:cTn id="1" dur="indefinite" restart="never" nodeType="tmRoot"/>
+      </p:par>
+    </p:tnLst>
+  </p:timing>
+</p:sld>
+</file>
+
+<file path=ppt/slides/slide8.xml><?xml version="1.0" encoding="utf-8"?>
+<p:sld xmlns:a="http://schemas.openxmlformats.org/drawingml/2006/main" xmlns:r="http://schemas.openxmlformats.org/officeDocument/2006/relationships" xmlns:p="http://schemas.openxmlformats.org/presentationml/2006/main">
+  <p:cSld>
+    <p:spTree>
+      <p:nvGrpSpPr>
+        <p:cNvPr id="1" name=""/>
+        <p:cNvGrpSpPr/>
+        <p:nvPr/>
+      </p:nvGrpSpPr>
+      <p:grpSpPr>
+        <a:xfrm>
+          <a:off x="0" y="0"/>
+          <a:ext cx="0" cy="0"/>
+          <a:chOff x="0" y="0"/>
+          <a:chExt cx="0" cy="0"/>
+        </a:xfrm>
+      </p:grpSpPr>
+      <p:pic>
+        <p:nvPicPr>
+          <p:cNvPr id="5" name="Picture Placeholder 4"/>
+          <p:cNvPicPr>
+            <a:picLocks noGrp="1" noChangeAspect="1"/>
+          </p:cNvPicPr>
+          <p:nvPr>
+            <p:ph type="pic" sz="quarter" idx="11"/>
+          </p:nvPr>
+        </p:nvPicPr>
+        <p:blipFill>
+          <a:blip r:embed="rId2">
+            <a:extLst>
+              <a:ext uri="{28A0092B-C50C-407E-A947-70E740481C1C}">
+                <a14:useLocalDpi xmlns:a14="http://schemas.microsoft.com/office/drawing/2010/main" val="0"/>
+              </a:ext>
+            </a:extLst>
+          </a:blip>
+          <a:stretch>
+            <a:fillRect/>
+          </a:stretch>
+        </p:blipFill>
+        <p:spPr>
+          <a:xfrm>
+            <a:off x="1303691" y="-1"/>
+            <a:ext cx="9584618" cy="6329083"/>
+          </a:xfrm>
+          <a:prstGeom prst="rect">
+            <a:avLst/>
+          </a:prstGeom>
+          <a:noFill/>
+          <a:ln>
+            <a:noFill/>
+          </a:ln>
+        </p:spPr>
+      </p:pic>
+      <p:sp>
+        <p:nvSpPr>
+          <p:cNvPr id="3" name="Title 2"/>
+          <p:cNvSpPr>
+            <a:spLocks noGrp="1"/>
+          </p:cNvSpPr>
+          <p:nvPr>
+            <p:ph type="title"/>
+          </p:nvPr>
+        </p:nvSpPr>
+        <p:spPr/>
+        <p:txBody>
+          <a:bodyPr/>
+          <a:lstStyle/>
+          <a:p>
+            <a:r>
+              <a:rPr lang="en-US" dirty="0" smtClean="0"/>
+              <a:t>Productivity doubles every 2 years</a:t>
+            </a:r>
+            <a:endParaRPr lang="en-US" dirty="0"/>
+          </a:p>
+        </p:txBody>
+      </p:sp>
+      <p:sp>
+        <p:nvSpPr>
+          <p:cNvPr id="4" name="Text Placeholder 3"/>
+          <p:cNvSpPr>
+            <a:spLocks noGrp="1"/>
+          </p:cNvSpPr>
+          <p:nvPr>
+            <p:ph type="body" sz="quarter" idx="10"/>
+          </p:nvPr>
+        </p:nvSpPr>
+        <p:spPr/>
+        <p:txBody>
+          <a:bodyPr/>
+          <a:lstStyle/>
+          <a:p>
+            <a:r>
+              <a:rPr lang="en-US" dirty="0" smtClean="0"/>
+              <a:t>Hunter Technologies</a:t>
+            </a:r>
+            <a:endParaRPr lang="en-US" dirty="0"/>
+          </a:p>
+        </p:txBody>
+      </p:sp>
+    </p:spTree>
+    <p:extLst>
+      <p:ext uri="{BB962C8B-B14F-4D97-AF65-F5344CB8AC3E}">
+        <p14:creationId xmlns:p14="http://schemas.microsoft.com/office/powerpoint/2010/main" val="2892196902"/>
+      </p:ext>
+    </p:extLst>
+  </p:cSld>
+  <p:clrMapOvr>
+    <a:masterClrMapping/>
+  </p:clrMapOvr>
+  <p:timing>
+    <p:tnLst>
+      <p:par>
+        <p:cTn id="1" dur="indefinite" restart="never" nodeType="tmRoot"/>
+      </p:par>
+    </p:tnLst>
+  </p:timing>
+</p:sld>
+</file>
+
+<file path=ppt/slides/slide9.xml><?xml version="1.0" encoding="utf-8"?>
+<p:sld xmlns:a="http://schemas.openxmlformats.org/drawingml/2006/main" xmlns:r="http://schemas.openxmlformats.org/officeDocument/2006/relationships" xmlns:p="http://schemas.openxmlformats.org/presentationml/2006/main">
+  <p:cSld>
+    <p:spTree>
+      <p:nvGrpSpPr>
+        <p:cNvPr id="1" name=""/>
+        <p:cNvGrpSpPr/>
+        <p:nvPr/>
+      </p:nvGrpSpPr>
+      <p:grpSpPr>
+        <a:xfrm>
+          <a:off x="0" y="0"/>
+          <a:ext cx="0" cy="0"/>
+          <a:chOff x="0" y="0"/>
+          <a:chExt cx="0" cy="0"/>
+        </a:xfrm>
+      </p:grpSpPr>
+      <p:pic>
+        <p:nvPicPr>
+          <p:cNvPr id="5" name="Picture Placeholder 4"/>
+          <p:cNvPicPr>
+            <a:picLocks noGrp="1" noChangeAspect="1"/>
+          </p:cNvPicPr>
+          <p:nvPr>
+            <p:ph type="pic" sz="quarter" idx="11"/>
+          </p:nvPr>
+        </p:nvPicPr>
+        <p:blipFill>
+          <a:blip r:embed="rId2">
+            <a:extLst>
+              <a:ext uri="{28A0092B-C50C-407E-A947-70E740481C1C}">
+                <a14:useLocalDpi xmlns:a14="http://schemas.microsoft.com/office/drawing/2010/main" val="0"/>
+              </a:ext>
+            </a:extLst>
+          </a:blip>
+          <a:stretch>
+            <a:fillRect/>
+          </a:stretch>
+        </p:blipFill>
+        <p:spPr>
+          <a:xfrm>
+            <a:off x="946085" y="0"/>
+            <a:ext cx="10299831" cy="6938682"/>
+          </a:xfrm>
+          <a:prstGeom prst="rect">
+            <a:avLst/>
+          </a:prstGeom>
+          <a:noFill/>
+          <a:ln>
+            <a:noFill/>
+          </a:ln>
+        </p:spPr>
+      </p:pic>
+      <p:sp>
+        <p:nvSpPr>
+          <p:cNvPr id="3" name="Title 2"/>
+          <p:cNvSpPr>
+            <a:spLocks noGrp="1"/>
+          </p:cNvSpPr>
+          <p:nvPr>
+            <p:ph type="title"/>
+          </p:nvPr>
+        </p:nvSpPr>
+        <p:spPr/>
+        <p:txBody>
+          <a:bodyPr/>
+          <a:lstStyle/>
+          <a:p>
+            <a:r>
+              <a:rPr lang="en-US" dirty="0" smtClean="0"/>
+              <a:t>Legacy code gives 3x productive BOOST</a:t>
+            </a:r>
+            <a:endParaRPr lang="en-US" dirty="0"/>
+          </a:p>
+        </p:txBody>
+      </p:sp>
+      <p:sp>
+        <p:nvSpPr>
+          <p:cNvPr id="4" name="Text Placeholder 3"/>
+          <p:cNvSpPr>
+            <a:spLocks noGrp="1"/>
+          </p:cNvSpPr>
+          <p:nvPr>
+            <p:ph type="body" sz="quarter" idx="10"/>
+          </p:nvPr>
+        </p:nvSpPr>
+        <p:spPr/>
+        <p:txBody>
+          <a:bodyPr/>
+          <a:lstStyle/>
+          <a:p>
+            <a:r>
+              <a:rPr lang="en-US" dirty="0" smtClean="0"/>
+              <a:t>James Shore internationalization refactoring</a:t>
+            </a:r>
+            <a:endParaRPr lang="en-US" dirty="0"/>
+          </a:p>
+        </p:txBody>
+      </p:sp>
+    </p:spTree>
+    <p:extLst>
+      <p:ext uri="{BB962C8B-B14F-4D97-AF65-F5344CB8AC3E}">
+        <p14:creationId xmlns:p14="http://schemas.microsoft.com/office/powerpoint/2010/main" val="4255149956"/>
       </p:ext>
     </p:extLst>
   </p:cSld>

</xml_diff>

<commit_message>
The final form, as presented at Agile India 2014.
</commit_message>
<xml_diff>
--- a/top teams/top teams.pptx
+++ b/top teams/top teams.pptx
@@ -4000,18 +4000,31 @@
           <a:chExt cx="0" cy="0"/>
         </a:xfrm>
       </p:grpSpPr>
-      <p:sp>
-        <p:nvSpPr>
-          <p:cNvPr id="2" name="Picture Placeholder 1"/>
-          <p:cNvSpPr>
-            <a:spLocks noGrp="1"/>
-          </p:cNvSpPr>
+      <p:pic>
+        <p:nvPicPr>
+          <p:cNvPr id="5" name="Picture Placeholder 4"/>
+          <p:cNvPicPr>
+            <a:picLocks noGrp="1" noChangeAspect="1"/>
+          </p:cNvPicPr>
           <p:nvPr>
             <p:ph type="pic" sz="quarter" idx="11"/>
           </p:nvPr>
-        </p:nvSpPr>
+        </p:nvPicPr>
+        <p:blipFill>
+          <a:blip r:embed="rId2">
+            <a:extLst>
+              <a:ext uri="{28A0092B-C50C-407E-A947-70E740481C1C}">
+                <a14:useLocalDpi xmlns:a14="http://schemas.microsoft.com/office/drawing/2010/main" val="0"/>
+              </a:ext>
+            </a:extLst>
+          </a:blip>
+          <a:srcRect t="7356" b="7356"/>
+          <a:stretch>
+            <a:fillRect/>
+          </a:stretch>
+        </p:blipFill>
         <p:spPr/>
-      </p:sp>
+      </p:pic>
       <p:sp>
         <p:nvSpPr>
           <p:cNvPr id="3" name="Title 2"/>
@@ -4095,18 +4108,42 @@
           <a:chExt cx="0" cy="0"/>
         </a:xfrm>
       </p:grpSpPr>
-      <p:sp>
-        <p:nvSpPr>
-          <p:cNvPr id="2" name="Picture Placeholder 1"/>
-          <p:cNvSpPr>
-            <a:spLocks noGrp="1"/>
-          </p:cNvSpPr>
+      <p:pic>
+        <p:nvPicPr>
+          <p:cNvPr id="5" name="Picture Placeholder 4"/>
+          <p:cNvPicPr>
+            <a:picLocks noGrp="1" noChangeAspect="1"/>
+          </p:cNvPicPr>
           <p:nvPr>
             <p:ph type="pic" sz="quarter" idx="11"/>
           </p:nvPr>
-        </p:nvSpPr>
-        <p:spPr/>
-      </p:sp>
+        </p:nvPicPr>
+        <p:blipFill>
+          <a:blip r:embed="rId2">
+            <a:extLst>
+              <a:ext uri="{28A0092B-C50C-407E-A947-70E740481C1C}">
+                <a14:useLocalDpi xmlns:a14="http://schemas.microsoft.com/office/drawing/2010/main" val="0"/>
+              </a:ext>
+            </a:extLst>
+          </a:blip>
+          <a:stretch>
+            <a:fillRect/>
+          </a:stretch>
+        </p:blipFill>
+        <p:spPr>
+          <a:xfrm>
+            <a:off x="1102658" y="1"/>
+            <a:ext cx="8863997" cy="6858000"/>
+          </a:xfrm>
+          <a:prstGeom prst="rect">
+            <a:avLst/>
+          </a:prstGeom>
+          <a:noFill/>
+          <a:ln>
+            <a:noFill/>
+          </a:ln>
+        </p:spPr>
+      </p:pic>
       <p:sp>
         <p:nvSpPr>
           <p:cNvPr id="3" name="Title 2"/>
@@ -4190,18 +4227,31 @@
           <a:chExt cx="0" cy="0"/>
         </a:xfrm>
       </p:grpSpPr>
-      <p:sp>
-        <p:nvSpPr>
-          <p:cNvPr id="2" name="Picture Placeholder 1"/>
-          <p:cNvSpPr>
-            <a:spLocks noGrp="1"/>
-          </p:cNvSpPr>
+      <p:pic>
+        <p:nvPicPr>
+          <p:cNvPr id="5" name="Picture Placeholder 4"/>
+          <p:cNvPicPr>
+            <a:picLocks noGrp="1" noChangeAspect="1"/>
+          </p:cNvPicPr>
           <p:nvPr>
             <p:ph type="pic" sz="quarter" idx="11"/>
           </p:nvPr>
-        </p:nvSpPr>
+        </p:nvPicPr>
+        <p:blipFill>
+          <a:blip r:embed="rId2">
+            <a:extLst>
+              <a:ext uri="{28A0092B-C50C-407E-A947-70E740481C1C}">
+                <a14:useLocalDpi xmlns:a14="http://schemas.microsoft.com/office/drawing/2010/main" val="0"/>
+              </a:ext>
+            </a:extLst>
+          </a:blip>
+          <a:srcRect t="658" b="658"/>
+          <a:stretch>
+            <a:fillRect/>
+          </a:stretch>
+        </p:blipFill>
         <p:spPr/>
-      </p:sp>
+      </p:pic>
       <p:sp>
         <p:nvSpPr>
           <p:cNvPr id="3" name="Title 2"/>
@@ -4285,18 +4335,42 @@
           <a:chExt cx="0" cy="0"/>
         </a:xfrm>
       </p:grpSpPr>
-      <p:sp>
-        <p:nvSpPr>
-          <p:cNvPr id="2" name="Picture Placeholder 1"/>
-          <p:cNvSpPr>
-            <a:spLocks noGrp="1"/>
-          </p:cNvSpPr>
+      <p:pic>
+        <p:nvPicPr>
+          <p:cNvPr id="5" name="Picture Placeholder 4"/>
+          <p:cNvPicPr>
+            <a:picLocks noGrp="1" noChangeAspect="1"/>
+          </p:cNvPicPr>
           <p:nvPr>
             <p:ph type="pic" sz="quarter" idx="11"/>
           </p:nvPr>
-        </p:nvSpPr>
-        <p:spPr/>
-      </p:sp>
+        </p:nvPicPr>
+        <p:blipFill>
+          <a:blip r:embed="rId2">
+            <a:extLst>
+              <a:ext uri="{28A0092B-C50C-407E-A947-70E740481C1C}">
+                <a14:useLocalDpi xmlns:a14="http://schemas.microsoft.com/office/drawing/2010/main" val="0"/>
+              </a:ext>
+            </a:extLst>
+          </a:blip>
+          <a:stretch>
+            <a:fillRect/>
+          </a:stretch>
+        </p:blipFill>
+        <p:spPr>
+          <a:xfrm>
+            <a:off x="730899" y="0"/>
+            <a:ext cx="10730203" cy="6858000"/>
+          </a:xfrm>
+          <a:prstGeom prst="rect">
+            <a:avLst/>
+          </a:prstGeom>
+          <a:noFill/>
+          <a:ln>
+            <a:noFill/>
+          </a:ln>
+        </p:spPr>
+      </p:pic>
       <p:sp>
         <p:nvSpPr>
           <p:cNvPr id="3" name="Title 2"/>
@@ -4432,6 +4506,34 @@
           </a:p>
         </p:txBody>
       </p:sp>
+      <p:sp>
+        <p:nvSpPr>
+          <p:cNvPr id="7" name="Text Placeholder 3"/>
+          <p:cNvSpPr>
+            <a:spLocks noGrp="1"/>
+          </p:cNvSpPr>
+          <p:nvPr>
+            <p:ph type="body" sz="quarter" idx="10"/>
+          </p:nvPr>
+        </p:nvSpPr>
+        <p:spPr>
+          <a:xfrm>
+            <a:off x="0" y="6338048"/>
+            <a:ext cx="12192000" cy="528918"/>
+          </a:xfrm>
+        </p:spPr>
+        <p:txBody>
+          <a:bodyPr/>
+          <a:lstStyle/>
+          <a:p>
+            <a:r>
+              <a:rPr lang="en-US" dirty="0" smtClean="0"/>
+              <a:t>Silver Platter transition</a:t>
+            </a:r>
+            <a:endParaRPr lang="en-US" dirty="0"/>
+          </a:p>
+        </p:txBody>
+      </p:sp>
     </p:spTree>
     <p:extLst>
       <p:ext uri="{BB962C8B-B14F-4D97-AF65-F5344CB8AC3E}">
@@ -4469,18 +4571,31 @@
           <a:chExt cx="0" cy="0"/>
         </a:xfrm>
       </p:grpSpPr>
-      <p:sp>
-        <p:nvSpPr>
-          <p:cNvPr id="2" name="Picture Placeholder 1"/>
-          <p:cNvSpPr>
-            <a:spLocks noGrp="1"/>
-          </p:cNvSpPr>
+      <p:pic>
+        <p:nvPicPr>
+          <p:cNvPr id="5" name="Picture Placeholder 4"/>
+          <p:cNvPicPr>
+            <a:picLocks noGrp="1" noChangeAspect="1"/>
+          </p:cNvPicPr>
           <p:nvPr>
             <p:ph type="pic" sz="quarter" idx="11"/>
           </p:nvPr>
-        </p:nvSpPr>
+        </p:nvPicPr>
+        <p:blipFill>
+          <a:blip r:embed="rId2">
+            <a:extLst>
+              <a:ext uri="{28A0092B-C50C-407E-A947-70E740481C1C}">
+                <a14:useLocalDpi xmlns:a14="http://schemas.microsoft.com/office/drawing/2010/main" val="0"/>
+              </a:ext>
+            </a:extLst>
+          </a:blip>
+          <a:srcRect t="9256" b="9256"/>
+          <a:stretch>
+            <a:fillRect/>
+          </a:stretch>
+        </p:blipFill>
         <p:spPr/>
-      </p:sp>
+      </p:pic>
       <p:sp>
         <p:nvSpPr>
           <p:cNvPr id="3" name="Title 2"/>
@@ -5141,7 +5256,12 @@
             <p:ph type="body" sz="quarter" idx="10"/>
           </p:nvPr>
         </p:nvSpPr>
-        <p:spPr/>
+        <p:spPr>
+          <a:xfrm>
+            <a:off x="0" y="6338048"/>
+            <a:ext cx="12192000" cy="528918"/>
+          </a:xfrm>
+        </p:spPr>
         <p:txBody>
           <a:bodyPr/>
           <a:lstStyle/>
@@ -5364,7 +5484,7 @@
           <a:p>
             <a:r>
               <a:rPr lang="en-US" dirty="0" smtClean="0"/>
-              <a:t>Silver Platter</a:t>
+              <a:t>Blue Tech</a:t>
             </a:r>
             <a:endParaRPr lang="en-US" dirty="0"/>
           </a:p>

</xml_diff>